<commit_message>
Re-organizing tutorial directory. Moving main CVXlab presentation into tutorial directory.
</commit_message>
<xml_diff>
--- a/docs/images/flowchart.pptx
+++ b/docs/images/flowchart.pptx
@@ -7910,10 +7910,10 @@
       </p:pic>
       <p:sp>
         <p:nvSpPr>
-          <p:cNvPr id="20" name="Rettangolo 19">
-            <a:extLst>
-              <a:ext uri="{FF2B5EF4-FFF2-40B4-BE49-F238E27FC236}">
-                <a16:creationId xmlns:a16="http://schemas.microsoft.com/office/drawing/2014/main" id="{C00CEC02-AC11-DC00-37CC-2AA05942E4EF}"/>
+          <p:cNvPr id="78" name="Rettangolo 19">
+            <a:extLst>
+              <a:ext uri="{FF2B5EF4-FFF2-40B4-BE49-F238E27FC236}">
+                <a16:creationId xmlns:a16="http://schemas.microsoft.com/office/drawing/2014/main" id="{6BB39E0A-A136-E62C-1CF7-2373DE205B88}"/>
               </a:ext>
             </a:extLst>
           </p:cNvPr>
@@ -7922,1213 +7922,8 @@
         </p:nvSpPr>
         <p:spPr>
           <a:xfrm>
-            <a:off x="3728438" y="9686087"/>
-            <a:ext cx="1476000" cy="367229"/>
-          </a:xfrm>
-          <a:prstGeom prst="rect">
-            <a:avLst/>
-          </a:prstGeom>
-          <a:noFill/>
-          <a:ln w="12700">
-            <a:solidFill>
-              <a:schemeClr val="tx1"/>
-            </a:solidFill>
-          </a:ln>
-        </p:spPr>
-        <p:style>
-          <a:lnRef idx="2">
-            <a:schemeClr val="accent1">
-              <a:shade val="50000"/>
-            </a:schemeClr>
-          </a:lnRef>
-          <a:fillRef idx="1">
-            <a:schemeClr val="accent1"/>
-          </a:fillRef>
-          <a:effectRef idx="0">
-            <a:schemeClr val="accent1"/>
-          </a:effectRef>
-          <a:fontRef idx="minor">
-            <a:schemeClr val="lt1"/>
-          </a:fontRef>
-        </p:style>
-        <p:txBody>
-          <a:bodyPr rtlCol="0" anchor="ctr"/>
-          <a:lstStyle/>
-          <a:p>
-            <a:pPr algn="ctr"/>
-            <a:r>
-              <a:rPr lang="en-US" sz="1063" b="1" noProof="1">
-                <a:solidFill>
-                  <a:schemeClr val="tx1"/>
-                </a:solidFill>
-                <a:latin typeface="+mj-lt"/>
-                <a:ea typeface="Fira Code" pitchFamily="1" charset="0"/>
-                <a:cs typeface="Fira Code" pitchFamily="1" charset="0"/>
-              </a:rPr>
-              <a:t>4. Generation of model class instance</a:t>
-            </a:r>
-          </a:p>
-        </p:txBody>
-      </p:sp>
-      <p:sp>
-        <p:nvSpPr>
-          <p:cNvPr id="21" name="Rettangolo 19">
-            <a:extLst>
-              <a:ext uri="{FF2B5EF4-FFF2-40B4-BE49-F238E27FC236}">
-                <a16:creationId xmlns:a16="http://schemas.microsoft.com/office/drawing/2014/main" id="{71E629F0-53C3-E3D0-9687-FFDDF3290499}"/>
-              </a:ext>
-            </a:extLst>
-          </p:cNvPr>
-          <p:cNvSpPr/>
-          <p:nvPr/>
-        </p:nvSpPr>
-        <p:spPr>
-          <a:xfrm>
-            <a:off x="3728438" y="11859027"/>
-            <a:ext cx="1476000" cy="367229"/>
-          </a:xfrm>
-          <a:prstGeom prst="rect">
-            <a:avLst/>
-          </a:prstGeom>
-          <a:noFill/>
-          <a:ln w="12700">
-            <a:solidFill>
-              <a:schemeClr val="tx1"/>
-            </a:solidFill>
-          </a:ln>
-        </p:spPr>
-        <p:style>
-          <a:lnRef idx="2">
-            <a:schemeClr val="accent1">
-              <a:shade val="50000"/>
-            </a:schemeClr>
-          </a:lnRef>
-          <a:fillRef idx="1">
-            <a:schemeClr val="accent1"/>
-          </a:fillRef>
-          <a:effectRef idx="0">
-            <a:schemeClr val="accent1"/>
-          </a:effectRef>
-          <a:fontRef idx="minor">
-            <a:schemeClr val="lt1"/>
-          </a:fontRef>
-        </p:style>
-        <p:txBody>
-          <a:bodyPr rtlCol="0" anchor="ctr"/>
-          <a:lstStyle/>
-          <a:p>
-            <a:pPr algn="ctr"/>
-            <a:r>
-              <a:rPr lang="en-US" sz="1063" noProof="1">
-                <a:solidFill>
-                  <a:schemeClr val="tx1"/>
-                </a:solidFill>
-                <a:latin typeface="+mj-lt"/>
-                <a:ea typeface="Fira Code" pitchFamily="1" charset="0"/>
-                <a:cs typeface="Fira Code" pitchFamily="1" charset="0"/>
-              </a:rPr>
-              <a:t>8. Initialization of </a:t>
-            </a:r>
-            <a:br>
-              <a:rPr lang="en-US" sz="1063" noProof="1">
-                <a:solidFill>
-                  <a:schemeClr val="tx1"/>
-                </a:solidFill>
-                <a:latin typeface="+mj-lt"/>
-                <a:ea typeface="Fira Code" pitchFamily="1" charset="0"/>
-                <a:cs typeface="Fira Code" pitchFamily="1" charset="0"/>
-              </a:rPr>
-            </a:br>
-            <a:r>
-              <a:rPr lang="en-US" sz="1063" noProof="1">
-                <a:solidFill>
-                  <a:schemeClr val="tx1"/>
-                </a:solidFill>
-                <a:latin typeface="+mj-lt"/>
-                <a:ea typeface="Fira Code" pitchFamily="1" charset="0"/>
-                <a:cs typeface="Fira Code" pitchFamily="1" charset="0"/>
-              </a:rPr>
-              <a:t>numerical problem/s</a:t>
-            </a:r>
-          </a:p>
-        </p:txBody>
-      </p:sp>
-      <p:sp>
-        <p:nvSpPr>
-          <p:cNvPr id="25" name="Rettangolo 19">
-            <a:extLst>
-              <a:ext uri="{FF2B5EF4-FFF2-40B4-BE49-F238E27FC236}">
-                <a16:creationId xmlns:a16="http://schemas.microsoft.com/office/drawing/2014/main" id="{A083B54D-8F37-A0E6-727D-D70DCA65C25D}"/>
-              </a:ext>
-            </a:extLst>
-          </p:cNvPr>
-          <p:cNvSpPr/>
-          <p:nvPr/>
-        </p:nvSpPr>
-        <p:spPr>
-          <a:xfrm>
-            <a:off x="3728438" y="11144026"/>
-            <a:ext cx="1476000" cy="367229"/>
-          </a:xfrm>
-          <a:prstGeom prst="rect">
-            <a:avLst/>
-          </a:prstGeom>
-          <a:noFill/>
-          <a:ln w="12700">
-            <a:solidFill>
-              <a:schemeClr val="tx1"/>
-            </a:solidFill>
-          </a:ln>
-        </p:spPr>
-        <p:style>
-          <a:lnRef idx="2">
-            <a:schemeClr val="accent1">
-              <a:shade val="50000"/>
-            </a:schemeClr>
-          </a:lnRef>
-          <a:fillRef idx="1">
-            <a:schemeClr val="accent1"/>
-          </a:fillRef>
-          <a:effectRef idx="0">
-            <a:schemeClr val="accent1"/>
-          </a:effectRef>
-          <a:fontRef idx="minor">
-            <a:schemeClr val="lt1"/>
-          </a:fontRef>
-        </p:style>
-        <p:txBody>
-          <a:bodyPr rtlCol="0" anchor="ctr"/>
-          <a:lstStyle/>
-          <a:p>
-            <a:pPr algn="ctr"/>
-            <a:r>
-              <a:rPr lang="en-US" sz="1063" noProof="1">
-                <a:solidFill>
-                  <a:schemeClr val="tx1"/>
-                </a:solidFill>
-                <a:latin typeface="+mj-lt"/>
-                <a:ea typeface="Fira Code" pitchFamily="1" charset="0"/>
-                <a:cs typeface="Fira Code" pitchFamily="1" charset="0"/>
-              </a:rPr>
-              <a:t>7. Fill/update exogenous model data</a:t>
-            </a:r>
-          </a:p>
-        </p:txBody>
-      </p:sp>
-      <p:sp>
-        <p:nvSpPr>
-          <p:cNvPr id="26" name="Rettangolo 19">
-            <a:extLst>
-              <a:ext uri="{FF2B5EF4-FFF2-40B4-BE49-F238E27FC236}">
-                <a16:creationId xmlns:a16="http://schemas.microsoft.com/office/drawing/2014/main" id="{4433059C-546A-2607-9947-9943E31D98C1}"/>
-              </a:ext>
-            </a:extLst>
-          </p:cNvPr>
-          <p:cNvSpPr/>
-          <p:nvPr/>
-        </p:nvSpPr>
-        <p:spPr>
-          <a:xfrm>
-            <a:off x="3728438" y="12468824"/>
-            <a:ext cx="1476000" cy="367229"/>
-          </a:xfrm>
-          <a:prstGeom prst="rect">
-            <a:avLst/>
-          </a:prstGeom>
-          <a:noFill/>
-          <a:ln w="12700">
-            <a:solidFill>
-              <a:schemeClr val="tx1"/>
-            </a:solidFill>
-          </a:ln>
-        </p:spPr>
-        <p:style>
-          <a:lnRef idx="2">
-            <a:schemeClr val="accent1">
-              <a:shade val="50000"/>
-            </a:schemeClr>
-          </a:lnRef>
-          <a:fillRef idx="1">
-            <a:schemeClr val="accent1"/>
-          </a:fillRef>
-          <a:effectRef idx="0">
-            <a:schemeClr val="accent1"/>
-          </a:effectRef>
-          <a:fontRef idx="minor">
-            <a:schemeClr val="lt1"/>
-          </a:fontRef>
-        </p:style>
-        <p:txBody>
-          <a:bodyPr rtlCol="0" anchor="ctr"/>
-          <a:lstStyle/>
-          <a:p>
-            <a:pPr algn="ctr"/>
-            <a:r>
-              <a:rPr lang="en-US" sz="1063" noProof="1">
-                <a:solidFill>
-                  <a:schemeClr val="tx1"/>
-                </a:solidFill>
-                <a:latin typeface="+mj-lt"/>
-                <a:ea typeface="Fira Code" pitchFamily="1" charset="0"/>
-                <a:cs typeface="Fira Code" pitchFamily="1" charset="0"/>
-              </a:rPr>
-              <a:t>9. Solution of numerical problem/s</a:t>
-            </a:r>
-          </a:p>
-        </p:txBody>
-      </p:sp>
-      <p:sp>
-        <p:nvSpPr>
-          <p:cNvPr id="27" name="Rettangolo 19">
-            <a:extLst>
-              <a:ext uri="{FF2B5EF4-FFF2-40B4-BE49-F238E27FC236}">
-                <a16:creationId xmlns:a16="http://schemas.microsoft.com/office/drawing/2014/main" id="{E690F43A-BAB8-A6B7-0C6D-D50AE4182103}"/>
-              </a:ext>
-            </a:extLst>
-          </p:cNvPr>
-          <p:cNvSpPr/>
-          <p:nvPr/>
-        </p:nvSpPr>
-        <p:spPr>
-          <a:xfrm>
-            <a:off x="3728438" y="13078119"/>
-            <a:ext cx="1476000" cy="367229"/>
-          </a:xfrm>
-          <a:prstGeom prst="rect">
-            <a:avLst/>
-          </a:prstGeom>
-          <a:noFill/>
-          <a:ln w="12700">
-            <a:solidFill>
-              <a:schemeClr val="tx1"/>
-            </a:solidFill>
-          </a:ln>
-        </p:spPr>
-        <p:style>
-          <a:lnRef idx="2">
-            <a:schemeClr val="accent1">
-              <a:shade val="50000"/>
-            </a:schemeClr>
-          </a:lnRef>
-          <a:fillRef idx="1">
-            <a:schemeClr val="accent1"/>
-          </a:fillRef>
-          <a:effectRef idx="0">
-            <a:schemeClr val="accent1"/>
-          </a:effectRef>
-          <a:fontRef idx="minor">
-            <a:schemeClr val="lt1"/>
-          </a:fontRef>
-        </p:style>
-        <p:txBody>
-          <a:bodyPr rtlCol="0" anchor="ctr"/>
-          <a:lstStyle/>
-          <a:p>
-            <a:pPr algn="ctr"/>
-            <a:r>
-              <a:rPr lang="en-US" sz="1063" noProof="1">
-                <a:solidFill>
-                  <a:schemeClr val="tx1"/>
-                </a:solidFill>
-                <a:latin typeface="+mj-lt"/>
-                <a:ea typeface="Fira Code" pitchFamily="1" charset="0"/>
-                <a:cs typeface="Fira Code" pitchFamily="1" charset="0"/>
-              </a:rPr>
-              <a:t>10. Export endogenous model data</a:t>
-            </a:r>
-          </a:p>
-        </p:txBody>
-      </p:sp>
-      <p:cxnSp>
-        <p:nvCxnSpPr>
-          <p:cNvPr id="28" name="Connettore diritto 4">
-            <a:extLst>
-              <a:ext uri="{FF2B5EF4-FFF2-40B4-BE49-F238E27FC236}">
-                <a16:creationId xmlns:a16="http://schemas.microsoft.com/office/drawing/2014/main" id="{8A060BE2-6AFD-9D28-3432-967B1A446D11}"/>
-              </a:ext>
-            </a:extLst>
-          </p:cNvPr>
-          <p:cNvCxnSpPr>
-            <a:cxnSpLocks/>
-          </p:cNvCxnSpPr>
-          <p:nvPr/>
-        </p:nvCxnSpPr>
-        <p:spPr>
-          <a:xfrm>
-            <a:off x="10904802" y="10053316"/>
-            <a:ext cx="5594" cy="1805711"/>
-          </a:xfrm>
-          <a:prstGeom prst="line">
-            <a:avLst/>
-          </a:prstGeom>
-          <a:ln w="12700">
-            <a:solidFill>
-              <a:schemeClr val="tx1"/>
-            </a:solidFill>
-            <a:headEnd type="none" w="med" len="med"/>
-            <a:tailEnd type="triangle" w="med" len="med"/>
-          </a:ln>
-        </p:spPr>
-        <p:style>
-          <a:lnRef idx="1">
-            <a:schemeClr val="accent1"/>
-          </a:lnRef>
-          <a:fillRef idx="0">
-            <a:schemeClr val="accent1"/>
-          </a:fillRef>
-          <a:effectRef idx="0">
-            <a:schemeClr val="accent1"/>
-          </a:effectRef>
-          <a:fontRef idx="minor">
-            <a:schemeClr val="tx1"/>
-          </a:fontRef>
-        </p:style>
-      </p:cxnSp>
-      <p:cxnSp>
-        <p:nvCxnSpPr>
-          <p:cNvPr id="29" name="Connettore diritto 4">
-            <a:extLst>
-              <a:ext uri="{FF2B5EF4-FFF2-40B4-BE49-F238E27FC236}">
-                <a16:creationId xmlns:a16="http://schemas.microsoft.com/office/drawing/2014/main" id="{E17017AA-DE0A-E013-E3C9-DEC4BC640330}"/>
-              </a:ext>
-            </a:extLst>
-          </p:cNvPr>
-          <p:cNvCxnSpPr>
-            <a:cxnSpLocks/>
-          </p:cNvCxnSpPr>
-          <p:nvPr/>
-        </p:nvCxnSpPr>
-        <p:spPr>
-          <a:xfrm>
-            <a:off x="10615756" y="12642816"/>
-            <a:ext cx="0" cy="242568"/>
-          </a:xfrm>
-          <a:prstGeom prst="line">
-            <a:avLst/>
-          </a:prstGeom>
-          <a:ln w="12700">
-            <a:solidFill>
-              <a:schemeClr val="tx1"/>
-            </a:solidFill>
-            <a:headEnd type="none" w="med" len="med"/>
-            <a:tailEnd type="triangle" w="med" len="med"/>
-          </a:ln>
-        </p:spPr>
-        <p:style>
-          <a:lnRef idx="1">
-            <a:schemeClr val="accent1"/>
-          </a:lnRef>
-          <a:fillRef idx="0">
-            <a:schemeClr val="accent1"/>
-          </a:fillRef>
-          <a:effectRef idx="0">
-            <a:schemeClr val="accent1"/>
-          </a:effectRef>
-          <a:fontRef idx="minor">
-            <a:schemeClr val="tx1"/>
-          </a:fontRef>
-        </p:style>
-      </p:cxnSp>
-      <p:sp>
-        <p:nvSpPr>
-          <p:cNvPr id="30" name="Rettangolo 19">
-            <a:extLst>
-              <a:ext uri="{FF2B5EF4-FFF2-40B4-BE49-F238E27FC236}">
-                <a16:creationId xmlns:a16="http://schemas.microsoft.com/office/drawing/2014/main" id="{AB551B26-C5DA-6E48-12FA-83C3097D1897}"/>
-              </a:ext>
-            </a:extLst>
-          </p:cNvPr>
-          <p:cNvSpPr/>
-          <p:nvPr/>
-        </p:nvSpPr>
-        <p:spPr>
-          <a:xfrm>
-            <a:off x="6013677" y="9686087"/>
-            <a:ext cx="2191719" cy="367229"/>
-          </a:xfrm>
-          <a:prstGeom prst="rect">
-            <a:avLst/>
-          </a:prstGeom>
-          <a:noFill/>
-          <a:ln w="12700">
-            <a:noFill/>
-          </a:ln>
-        </p:spPr>
-        <p:style>
-          <a:lnRef idx="2">
-            <a:schemeClr val="accent1">
-              <a:shade val="50000"/>
-            </a:schemeClr>
-          </a:lnRef>
-          <a:fillRef idx="1">
-            <a:schemeClr val="accent1"/>
-          </a:fillRef>
-          <a:effectRef idx="0">
-            <a:schemeClr val="accent1"/>
-          </a:effectRef>
-          <a:fontRef idx="minor">
-            <a:schemeClr val="lt1"/>
-          </a:fontRef>
-        </p:style>
-        <p:txBody>
-          <a:bodyPr rtlCol="0" anchor="ctr"/>
-          <a:lstStyle/>
-          <a:p>
-            <a:r>
-              <a:rPr lang="en-US" sz="800" noProof="1">
-                <a:solidFill>
-                  <a:schemeClr val="tx1"/>
-                </a:solidFill>
-                <a:latin typeface="Fira Code" pitchFamily="1" charset="0"/>
-                <a:ea typeface="Fira Code" pitchFamily="1" charset="0"/>
-                <a:cs typeface="Fira Code" pitchFamily="1" charset="0"/>
-              </a:rPr>
-              <a:t>model = cvxlab.</a:t>
-            </a:r>
-            <a:r>
-              <a:rPr lang="en-US" sz="800" b="1" noProof="1">
-                <a:solidFill>
-                  <a:schemeClr val="tx1"/>
-                </a:solidFill>
-                <a:latin typeface="Fira Code" pitchFamily="1" charset="0"/>
-                <a:ea typeface="Fira Code" pitchFamily="1" charset="0"/>
-                <a:cs typeface="Fira Code" pitchFamily="1" charset="0"/>
-              </a:rPr>
-              <a:t>Model()</a:t>
-            </a:r>
-          </a:p>
-        </p:txBody>
-      </p:sp>
-      <p:sp>
-        <p:nvSpPr>
-          <p:cNvPr id="31" name="Rettangolo 19">
-            <a:extLst>
-              <a:ext uri="{FF2B5EF4-FFF2-40B4-BE49-F238E27FC236}">
-                <a16:creationId xmlns:a16="http://schemas.microsoft.com/office/drawing/2014/main" id="{92949D85-A749-2391-9DA0-2A15EAA89660}"/>
-              </a:ext>
-            </a:extLst>
-          </p:cNvPr>
-          <p:cNvSpPr/>
-          <p:nvPr/>
-        </p:nvSpPr>
-        <p:spPr>
-          <a:xfrm>
-            <a:off x="6013677" y="12477013"/>
-            <a:ext cx="1910853" cy="367229"/>
-          </a:xfrm>
-          <a:prstGeom prst="rect">
-            <a:avLst/>
-          </a:prstGeom>
-          <a:noFill/>
-          <a:ln w="12700">
-            <a:noFill/>
-          </a:ln>
-        </p:spPr>
-        <p:style>
-          <a:lnRef idx="2">
-            <a:schemeClr val="accent1">
-              <a:shade val="50000"/>
-            </a:schemeClr>
-          </a:lnRef>
-          <a:fillRef idx="1">
-            <a:schemeClr val="accent1"/>
-          </a:fillRef>
-          <a:effectRef idx="0">
-            <a:schemeClr val="accent1"/>
-          </a:effectRef>
-          <a:fontRef idx="minor">
-            <a:schemeClr val="lt1"/>
-          </a:fontRef>
-        </p:style>
-        <p:txBody>
-          <a:bodyPr rtlCol="0" anchor="ctr"/>
-          <a:lstStyle/>
-          <a:p>
-            <a:r>
-              <a:rPr lang="en-US" sz="800" noProof="1">
-                <a:solidFill>
-                  <a:schemeClr val="tx1"/>
-                </a:solidFill>
-                <a:latin typeface="Fira Code" pitchFamily="1" charset="0"/>
-                <a:ea typeface="Fira Code" pitchFamily="1" charset="0"/>
-                <a:cs typeface="Fira Code" pitchFamily="1" charset="0"/>
-              </a:rPr>
-              <a:t>model.</a:t>
-            </a:r>
-            <a:r>
-              <a:rPr lang="en-US" sz="800" b="1" noProof="1">
-                <a:solidFill>
-                  <a:schemeClr val="tx1"/>
-                </a:solidFill>
-                <a:latin typeface="Fira Code" pitchFamily="1" charset="0"/>
-                <a:ea typeface="Fira Code" pitchFamily="1" charset="0"/>
-                <a:cs typeface="Fira Code" pitchFamily="1" charset="0"/>
-              </a:rPr>
-              <a:t>run_model()</a:t>
-            </a:r>
-          </a:p>
-        </p:txBody>
-      </p:sp>
-      <p:sp>
-        <p:nvSpPr>
-          <p:cNvPr id="32" name="Rettangolo 19">
-            <a:extLst>
-              <a:ext uri="{FF2B5EF4-FFF2-40B4-BE49-F238E27FC236}">
-                <a16:creationId xmlns:a16="http://schemas.microsoft.com/office/drawing/2014/main" id="{C159800B-520F-4682-16EF-C629B1D62765}"/>
-              </a:ext>
-            </a:extLst>
-          </p:cNvPr>
-          <p:cNvSpPr/>
-          <p:nvPr/>
-        </p:nvSpPr>
-        <p:spPr>
-          <a:xfrm>
-            <a:off x="6013677" y="13086309"/>
-            <a:ext cx="2234220" cy="367229"/>
-          </a:xfrm>
-          <a:prstGeom prst="rect">
-            <a:avLst/>
-          </a:prstGeom>
-          <a:noFill/>
-          <a:ln w="12700">
-            <a:noFill/>
-          </a:ln>
-        </p:spPr>
-        <p:style>
-          <a:lnRef idx="2">
-            <a:schemeClr val="accent1">
-              <a:shade val="50000"/>
-            </a:schemeClr>
-          </a:lnRef>
-          <a:fillRef idx="1">
-            <a:schemeClr val="accent1"/>
-          </a:fillRef>
-          <a:effectRef idx="0">
-            <a:schemeClr val="accent1"/>
-          </a:effectRef>
-          <a:fontRef idx="minor">
-            <a:schemeClr val="lt1"/>
-          </a:fontRef>
-        </p:style>
-        <p:txBody>
-          <a:bodyPr rtlCol="0" anchor="ctr"/>
-          <a:lstStyle/>
-          <a:p>
-            <a:r>
-              <a:rPr lang="en-US" sz="800" noProof="1">
-                <a:solidFill>
-                  <a:schemeClr val="tx1"/>
-                </a:solidFill>
-                <a:latin typeface="Fira Code" pitchFamily="1" charset="0"/>
-                <a:ea typeface="Fira Code" pitchFamily="1" charset="0"/>
-                <a:cs typeface="Fira Code" pitchFamily="1" charset="0"/>
-              </a:rPr>
-              <a:t>model.</a:t>
-            </a:r>
-            <a:r>
-              <a:rPr lang="en-US" sz="800" b="1" noProof="1">
-                <a:solidFill>
-                  <a:schemeClr val="tx1"/>
-                </a:solidFill>
-                <a:latin typeface="Fira Code" pitchFamily="1" charset="0"/>
-                <a:ea typeface="Fira Code" pitchFamily="1" charset="0"/>
-                <a:cs typeface="Fira Code" pitchFamily="1" charset="0"/>
-              </a:rPr>
-              <a:t>load_results_to_database()</a:t>
-            </a:r>
-          </a:p>
-        </p:txBody>
-      </p:sp>
-      <p:cxnSp>
-        <p:nvCxnSpPr>
-          <p:cNvPr id="34" name="Connettore diritto 4">
-            <a:extLst>
-              <a:ext uri="{FF2B5EF4-FFF2-40B4-BE49-F238E27FC236}">
-                <a16:creationId xmlns:a16="http://schemas.microsoft.com/office/drawing/2014/main" id="{B0D13083-5362-84D0-262E-76D943F3186E}"/>
-              </a:ext>
-            </a:extLst>
-          </p:cNvPr>
-          <p:cNvCxnSpPr>
-            <a:cxnSpLocks/>
-          </p:cNvCxnSpPr>
-          <p:nvPr/>
-        </p:nvCxnSpPr>
-        <p:spPr>
-          <a:xfrm>
-            <a:off x="10615756" y="13252613"/>
-            <a:ext cx="0" cy="242066"/>
-          </a:xfrm>
-          <a:prstGeom prst="line">
-            <a:avLst/>
-          </a:prstGeom>
-          <a:ln w="12700">
-            <a:solidFill>
-              <a:schemeClr val="tx1"/>
-            </a:solidFill>
-            <a:headEnd type="none" w="med" len="med"/>
-            <a:tailEnd type="triangle" w="med" len="med"/>
-          </a:ln>
-        </p:spPr>
-        <p:style>
-          <a:lnRef idx="1">
-            <a:schemeClr val="accent1"/>
-          </a:lnRef>
-          <a:fillRef idx="0">
-            <a:schemeClr val="accent1"/>
-          </a:fillRef>
-          <a:effectRef idx="0">
-            <a:schemeClr val="accent1"/>
-          </a:effectRef>
-          <a:fontRef idx="minor">
-            <a:schemeClr val="tx1"/>
-          </a:fontRef>
-        </p:style>
-      </p:cxnSp>
-      <p:cxnSp>
-        <p:nvCxnSpPr>
-          <p:cNvPr id="35" name="Connettore diritto 4">
-            <a:extLst>
-              <a:ext uri="{FF2B5EF4-FFF2-40B4-BE49-F238E27FC236}">
-                <a16:creationId xmlns:a16="http://schemas.microsoft.com/office/drawing/2014/main" id="{327D6515-4B8C-F5EA-E29E-36A71F670169}"/>
-              </a:ext>
-            </a:extLst>
-          </p:cNvPr>
-          <p:cNvCxnSpPr>
-            <a:cxnSpLocks/>
-          </p:cNvCxnSpPr>
-          <p:nvPr/>
-        </p:nvCxnSpPr>
-        <p:spPr>
-          <a:xfrm>
-            <a:off x="3339498" y="11327641"/>
-            <a:ext cx="376137" cy="0"/>
-          </a:xfrm>
-          <a:prstGeom prst="line">
-            <a:avLst/>
-          </a:prstGeom>
-          <a:ln w="12700">
-            <a:solidFill>
-              <a:schemeClr val="tx1"/>
-            </a:solidFill>
-            <a:prstDash val="sysDash"/>
-            <a:headEnd type="none" w="med" len="med"/>
-            <a:tailEnd type="triangle" w="med" len="med"/>
-          </a:ln>
-        </p:spPr>
-        <p:style>
-          <a:lnRef idx="1">
-            <a:schemeClr val="accent1"/>
-          </a:lnRef>
-          <a:fillRef idx="0">
-            <a:schemeClr val="accent1"/>
-          </a:fillRef>
-          <a:effectRef idx="0">
-            <a:schemeClr val="accent1"/>
-          </a:effectRef>
-          <a:fontRef idx="minor">
-            <a:schemeClr val="tx1"/>
-          </a:fontRef>
-        </p:style>
-      </p:cxnSp>
-      <p:sp>
-        <p:nvSpPr>
-          <p:cNvPr id="36" name="TextBox 35">
-            <a:extLst>
-              <a:ext uri="{FF2B5EF4-FFF2-40B4-BE49-F238E27FC236}">
-                <a16:creationId xmlns:a16="http://schemas.microsoft.com/office/drawing/2014/main" id="{C6C8675C-B2C6-ECE2-3B44-4A93C945EB5D}"/>
-              </a:ext>
-            </a:extLst>
-          </p:cNvPr>
-          <p:cNvSpPr txBox="1"/>
-          <p:nvPr/>
-        </p:nvSpPr>
-        <p:spPr>
-          <a:xfrm>
-            <a:off x="1633312" y="11101237"/>
-            <a:ext cx="1694813" cy="461665"/>
-          </a:xfrm>
-          <a:prstGeom prst="rect">
-            <a:avLst/>
-          </a:prstGeom>
-          <a:noFill/>
-        </p:spPr>
-        <p:txBody>
-          <a:bodyPr wrap="square">
-            <a:spAutoFit/>
-          </a:bodyPr>
-          <a:lstStyle/>
-          <a:p>
-            <a:pPr algn="r"/>
-            <a:r>
-              <a:rPr lang="en-US" sz="1200" i="1" noProof="1">
-                <a:solidFill>
-                  <a:schemeClr val="tx1"/>
-                </a:solidFill>
-                <a:latin typeface="+mj-lt"/>
-                <a:ea typeface="Fira Code" pitchFamily="1" charset="0"/>
-                <a:cs typeface="Fira Code" pitchFamily="1" charset="0"/>
-              </a:rPr>
-              <a:t>User data input</a:t>
-            </a:r>
-          </a:p>
-          <a:p>
-            <a:pPr algn="r"/>
-            <a:r>
-              <a:rPr lang="en-US" sz="1200" i="1" noProof="1">
-                <a:latin typeface="+mj-lt"/>
-                <a:ea typeface="Fira Code" pitchFamily="1" charset="0"/>
-                <a:cs typeface="Fira Code" pitchFamily="1" charset="0"/>
-              </a:rPr>
-              <a:t>(updating existing data)</a:t>
-            </a:r>
-            <a:endParaRPr lang="en-US" sz="1200" i="1" dirty="0"/>
-          </a:p>
-        </p:txBody>
-      </p:sp>
-      <p:sp>
-        <p:nvSpPr>
-          <p:cNvPr id="37" name="Rettangolo 19">
-            <a:extLst>
-              <a:ext uri="{FF2B5EF4-FFF2-40B4-BE49-F238E27FC236}">
-                <a16:creationId xmlns:a16="http://schemas.microsoft.com/office/drawing/2014/main" id="{DB534124-A913-6CB1-829E-15EDA52F8032}"/>
-              </a:ext>
-            </a:extLst>
-          </p:cNvPr>
-          <p:cNvSpPr/>
-          <p:nvPr/>
-        </p:nvSpPr>
-        <p:spPr>
-          <a:xfrm>
-            <a:off x="6013677" y="11956191"/>
-            <a:ext cx="2415238" cy="189079"/>
-          </a:xfrm>
-          <a:prstGeom prst="rect">
-            <a:avLst/>
-          </a:prstGeom>
-          <a:noFill/>
-          <a:ln w="12700">
-            <a:noFill/>
-          </a:ln>
-        </p:spPr>
-        <p:style>
-          <a:lnRef idx="2">
-            <a:schemeClr val="accent1">
-              <a:shade val="50000"/>
-            </a:schemeClr>
-          </a:lnRef>
-          <a:fillRef idx="1">
-            <a:schemeClr val="accent1"/>
-          </a:fillRef>
-          <a:effectRef idx="0">
-            <a:schemeClr val="accent1"/>
-          </a:effectRef>
-          <a:fontRef idx="minor">
-            <a:schemeClr val="lt1"/>
-          </a:fontRef>
-        </p:style>
-        <p:txBody>
-          <a:bodyPr rtlCol="0" anchor="ctr"/>
-          <a:lstStyle/>
-          <a:p>
-            <a:pPr>
-              <a:spcAft>
-                <a:spcPts val="200"/>
-              </a:spcAft>
-            </a:pPr>
-            <a:r>
-              <a:rPr lang="en-US" sz="800" noProof="1">
-                <a:solidFill>
-                  <a:schemeClr val="tx1"/>
-                </a:solidFill>
-                <a:latin typeface="Fira Code" pitchFamily="1" charset="0"/>
-                <a:ea typeface="Fira Code" pitchFamily="1" charset="0"/>
-                <a:cs typeface="Fira Code" pitchFamily="1" charset="0"/>
-              </a:rPr>
-              <a:t>model.</a:t>
-            </a:r>
-            <a:r>
-              <a:rPr lang="en-US" sz="800" b="1" noProof="1">
-                <a:solidFill>
-                  <a:schemeClr val="tx1"/>
-                </a:solidFill>
-                <a:latin typeface="Fira Code" pitchFamily="1" charset="0"/>
-                <a:ea typeface="Fira Code" pitchFamily="1" charset="0"/>
-                <a:cs typeface="Fira Code" pitchFamily="1" charset="0"/>
-              </a:rPr>
-              <a:t>update_database_and_problem()</a:t>
-            </a:r>
-          </a:p>
-        </p:txBody>
-      </p:sp>
-      <p:sp>
-        <p:nvSpPr>
-          <p:cNvPr id="38" name="Rettangolo 19">
-            <a:extLst>
-              <a:ext uri="{FF2B5EF4-FFF2-40B4-BE49-F238E27FC236}">
-                <a16:creationId xmlns:a16="http://schemas.microsoft.com/office/drawing/2014/main" id="{988E47CC-FF1E-FD85-1469-1F848E955CE5}"/>
-              </a:ext>
-            </a:extLst>
-          </p:cNvPr>
-          <p:cNvSpPr/>
-          <p:nvPr/>
-        </p:nvSpPr>
-        <p:spPr>
-          <a:xfrm>
-            <a:off x="3728438" y="10415299"/>
-            <a:ext cx="1476000" cy="367229"/>
-          </a:xfrm>
-          <a:prstGeom prst="rect">
-            <a:avLst/>
-          </a:prstGeom>
-          <a:noFill/>
-          <a:ln w="12700">
-            <a:solidFill>
-              <a:schemeClr val="tx1"/>
-            </a:solidFill>
-          </a:ln>
-        </p:spPr>
-        <p:style>
-          <a:lnRef idx="2">
-            <a:schemeClr val="accent1">
-              <a:shade val="50000"/>
-            </a:schemeClr>
-          </a:lnRef>
-          <a:fillRef idx="1">
-            <a:schemeClr val="accent1"/>
-          </a:fillRef>
-          <a:effectRef idx="0">
-            <a:schemeClr val="accent1"/>
-          </a:effectRef>
-          <a:fontRef idx="minor">
-            <a:schemeClr val="lt1"/>
-          </a:fontRef>
-        </p:style>
-        <p:txBody>
-          <a:bodyPr rtlCol="0" anchor="ctr"/>
-          <a:lstStyle/>
-          <a:p>
-            <a:pPr algn="ctr"/>
-            <a:r>
-              <a:rPr lang="en-US" sz="1063" noProof="1">
-                <a:solidFill>
-                  <a:schemeClr val="tx1"/>
-                </a:solidFill>
-                <a:latin typeface="+mj-lt"/>
-                <a:ea typeface="Fira Code" pitchFamily="1" charset="0"/>
-                <a:cs typeface="Fira Code" pitchFamily="1" charset="0"/>
-              </a:rPr>
-              <a:t>3. Fill model setup file/s</a:t>
-            </a:r>
-          </a:p>
-        </p:txBody>
-      </p:sp>
-      <p:cxnSp>
-        <p:nvCxnSpPr>
-          <p:cNvPr id="39" name="Connettore diritto 4">
-            <a:extLst>
-              <a:ext uri="{FF2B5EF4-FFF2-40B4-BE49-F238E27FC236}">
-                <a16:creationId xmlns:a16="http://schemas.microsoft.com/office/drawing/2014/main" id="{C55CE947-C97E-0E86-BB4E-6F6ED9671F63}"/>
-              </a:ext>
-            </a:extLst>
-          </p:cNvPr>
-          <p:cNvCxnSpPr>
-            <a:cxnSpLocks/>
-          </p:cNvCxnSpPr>
-          <p:nvPr/>
-        </p:nvCxnSpPr>
-        <p:spPr>
-          <a:xfrm>
-            <a:off x="3335592" y="10598915"/>
-            <a:ext cx="376137" cy="0"/>
-          </a:xfrm>
-          <a:prstGeom prst="line">
-            <a:avLst/>
-          </a:prstGeom>
-          <a:ln w="12700">
-            <a:solidFill>
-              <a:schemeClr val="tx1"/>
-            </a:solidFill>
-            <a:prstDash val="sysDash"/>
-            <a:headEnd type="none" w="med" len="med"/>
-            <a:tailEnd type="triangle" w="med" len="med"/>
-          </a:ln>
-        </p:spPr>
-        <p:style>
-          <a:lnRef idx="1">
-            <a:schemeClr val="accent1"/>
-          </a:lnRef>
-          <a:fillRef idx="0">
-            <a:schemeClr val="accent1"/>
-          </a:fillRef>
-          <a:effectRef idx="0">
-            <a:schemeClr val="accent1"/>
-          </a:effectRef>
-          <a:fontRef idx="minor">
-            <a:schemeClr val="tx1"/>
-          </a:fontRef>
-        </p:style>
-      </p:cxnSp>
-      <p:sp>
-        <p:nvSpPr>
-          <p:cNvPr id="40" name="TextBox 39">
-            <a:extLst>
-              <a:ext uri="{FF2B5EF4-FFF2-40B4-BE49-F238E27FC236}">
-                <a16:creationId xmlns:a16="http://schemas.microsoft.com/office/drawing/2014/main" id="{B0BC85BB-754B-AA65-91CA-1643D965F65E}"/>
-              </a:ext>
-            </a:extLst>
-          </p:cNvPr>
-          <p:cNvSpPr txBox="1"/>
-          <p:nvPr/>
-        </p:nvSpPr>
-        <p:spPr>
-          <a:xfrm>
-            <a:off x="1847441" y="10275749"/>
-            <a:ext cx="1476775" cy="646331"/>
-          </a:xfrm>
-          <a:prstGeom prst="rect">
-            <a:avLst/>
-          </a:prstGeom>
-          <a:noFill/>
-        </p:spPr>
-        <p:txBody>
-          <a:bodyPr wrap="square">
-            <a:spAutoFit/>
-          </a:bodyPr>
-          <a:lstStyle/>
-          <a:p>
-            <a:pPr algn="r"/>
-            <a:r>
-              <a:rPr lang="en-US" sz="1200" i="1" noProof="1">
-                <a:solidFill>
-                  <a:schemeClr val="tx1"/>
-                </a:solidFill>
-                <a:latin typeface="+mj-lt"/>
-                <a:ea typeface="Fira Code" pitchFamily="1" charset="0"/>
-                <a:cs typeface="Fira Code" pitchFamily="1" charset="0"/>
-              </a:rPr>
-              <a:t>User data input</a:t>
-            </a:r>
-          </a:p>
-          <a:p>
-            <a:pPr algn="r"/>
-            <a:r>
-              <a:rPr lang="en-US" sz="1200" i="1" noProof="1">
-                <a:latin typeface="+mj-lt"/>
-                <a:ea typeface="Fira Code" pitchFamily="1" charset="0"/>
-                <a:cs typeface="Fira Code" pitchFamily="1" charset="0"/>
-              </a:rPr>
-              <a:t>(only symbolic problem updates)</a:t>
-            </a:r>
-            <a:endParaRPr lang="en-US" sz="1200" i="1" dirty="0"/>
-          </a:p>
-        </p:txBody>
-      </p:sp>
-      <p:cxnSp>
-        <p:nvCxnSpPr>
-          <p:cNvPr id="48" name="Connector: Curved 47">
-            <a:extLst>
-              <a:ext uri="{FF2B5EF4-FFF2-40B4-BE49-F238E27FC236}">
-                <a16:creationId xmlns:a16="http://schemas.microsoft.com/office/drawing/2014/main" id="{08724D9E-AE51-BCF8-E41E-8A5136343732}"/>
-              </a:ext>
-            </a:extLst>
-          </p:cNvPr>
-          <p:cNvCxnSpPr>
-            <a:cxnSpLocks/>
-          </p:cNvCxnSpPr>
-          <p:nvPr/>
-        </p:nvCxnSpPr>
-        <p:spPr>
-          <a:xfrm rot="16200000" flipH="1">
-            <a:off x="11514771" y="11930004"/>
-            <a:ext cx="531387" cy="430532"/>
-          </a:xfrm>
-          <a:prstGeom prst="curvedConnector2">
-            <a:avLst/>
-          </a:prstGeom>
-          <a:ln w="12700">
-            <a:solidFill>
-              <a:schemeClr val="tx1"/>
-            </a:solidFill>
-            <a:headEnd type="none" w="med" len="med"/>
-            <a:tailEnd type="triangle" w="med" len="med"/>
-          </a:ln>
-        </p:spPr>
-        <p:style>
-          <a:lnRef idx="1">
-            <a:schemeClr val="accent1"/>
-          </a:lnRef>
-          <a:fillRef idx="0">
-            <a:schemeClr val="accent1"/>
-          </a:fillRef>
-          <a:effectRef idx="0">
-            <a:schemeClr val="accent1"/>
-          </a:effectRef>
-          <a:fontRef idx="minor">
-            <a:schemeClr val="tx1"/>
-          </a:fontRef>
-        </p:style>
-      </p:cxnSp>
-      <p:cxnSp>
-        <p:nvCxnSpPr>
-          <p:cNvPr id="57" name="Connector: Curved 56">
-            <a:extLst>
-              <a:ext uri="{FF2B5EF4-FFF2-40B4-BE49-F238E27FC236}">
-                <a16:creationId xmlns:a16="http://schemas.microsoft.com/office/drawing/2014/main" id="{8A1AA99F-2CC5-6642-DEFC-B176DD007499}"/>
-              </a:ext>
-            </a:extLst>
-          </p:cNvPr>
-          <p:cNvCxnSpPr>
-            <a:cxnSpLocks/>
-            <a:stCxn id="20" idx="3"/>
-            <a:endCxn id="21" idx="3"/>
-          </p:cNvCxnSpPr>
-          <p:nvPr/>
-        </p:nvCxnSpPr>
-        <p:spPr>
-          <a:xfrm>
-            <a:off x="5204438" y="9869702"/>
-            <a:ext cx="12700" cy="2172940"/>
-          </a:xfrm>
-          <a:prstGeom prst="curvedConnector3">
-            <a:avLst>
-              <a:gd name="adj1" fmla="val 3866669"/>
-            </a:avLst>
-          </a:prstGeom>
-          <a:ln w="12700">
-            <a:solidFill>
-              <a:schemeClr val="tx1"/>
-            </a:solidFill>
-            <a:headEnd type="none" w="med" len="med"/>
-            <a:tailEnd type="triangle" w="med" len="med"/>
-          </a:ln>
-        </p:spPr>
-        <p:style>
-          <a:lnRef idx="1">
-            <a:schemeClr val="accent1"/>
-          </a:lnRef>
-          <a:fillRef idx="0">
-            <a:schemeClr val="accent1"/>
-          </a:fillRef>
-          <a:effectRef idx="0">
-            <a:schemeClr val="accent1"/>
-          </a:effectRef>
-          <a:fontRef idx="minor">
-            <a:schemeClr val="tx1"/>
-          </a:fontRef>
-        </p:style>
-      </p:cxnSp>
-      <p:cxnSp>
-        <p:nvCxnSpPr>
-          <p:cNvPr id="82" name="Connettore diritto 4">
-            <a:extLst>
-              <a:ext uri="{FF2B5EF4-FFF2-40B4-BE49-F238E27FC236}">
-                <a16:creationId xmlns:a16="http://schemas.microsoft.com/office/drawing/2014/main" id="{0E1EF8BD-5220-3357-6B7E-630666C1169F}"/>
-              </a:ext>
-            </a:extLst>
-          </p:cNvPr>
-          <p:cNvCxnSpPr>
-            <a:cxnSpLocks/>
-            <a:stCxn id="20" idx="2"/>
-            <a:endCxn id="38" idx="0"/>
-          </p:cNvCxnSpPr>
-          <p:nvPr/>
-        </p:nvCxnSpPr>
-        <p:spPr>
-          <a:xfrm>
-            <a:off x="4466438" y="10053316"/>
-            <a:ext cx="0" cy="361983"/>
-          </a:xfrm>
-          <a:prstGeom prst="line">
-            <a:avLst/>
-          </a:prstGeom>
-          <a:ln w="12700">
-            <a:solidFill>
-              <a:schemeClr val="tx1"/>
-            </a:solidFill>
-            <a:headEnd type="none" w="med" len="med"/>
-            <a:tailEnd type="triangle" w="med" len="med"/>
-          </a:ln>
-        </p:spPr>
-        <p:style>
-          <a:lnRef idx="1">
-            <a:schemeClr val="accent1"/>
-          </a:lnRef>
-          <a:fillRef idx="0">
-            <a:schemeClr val="accent1"/>
-          </a:fillRef>
-          <a:effectRef idx="0">
-            <a:schemeClr val="accent1"/>
-          </a:effectRef>
-          <a:fontRef idx="minor">
-            <a:schemeClr val="tx1"/>
-          </a:fontRef>
-        </p:style>
-      </p:cxnSp>
-      <p:cxnSp>
-        <p:nvCxnSpPr>
-          <p:cNvPr id="108" name="Connector: Curved 107">
-            <a:extLst>
-              <a:ext uri="{FF2B5EF4-FFF2-40B4-BE49-F238E27FC236}">
-                <a16:creationId xmlns:a16="http://schemas.microsoft.com/office/drawing/2014/main" id="{6F148672-8737-2FAD-D813-DA793822C2D4}"/>
-              </a:ext>
-            </a:extLst>
-          </p:cNvPr>
-          <p:cNvCxnSpPr>
-            <a:cxnSpLocks/>
-            <a:stCxn id="20" idx="3"/>
-            <a:endCxn id="21" idx="3"/>
-          </p:cNvCxnSpPr>
-          <p:nvPr/>
-        </p:nvCxnSpPr>
-        <p:spPr>
-          <a:xfrm>
-            <a:off x="5204438" y="9869702"/>
-            <a:ext cx="12700" cy="2172940"/>
-          </a:xfrm>
-          <a:prstGeom prst="curvedConnector3">
-            <a:avLst>
-              <a:gd name="adj1" fmla="val 2766669"/>
-            </a:avLst>
-          </a:prstGeom>
-          <a:ln w="12700">
-            <a:solidFill>
-              <a:schemeClr val="tx1"/>
-            </a:solidFill>
-            <a:headEnd type="none" w="med" len="med"/>
-            <a:tailEnd type="triangle" w="med" len="med"/>
-          </a:ln>
-        </p:spPr>
-        <p:style>
-          <a:lnRef idx="1">
-            <a:schemeClr val="accent1"/>
-          </a:lnRef>
-          <a:fillRef idx="0">
-            <a:schemeClr val="accent1"/>
-          </a:fillRef>
-          <a:effectRef idx="0">
-            <a:schemeClr val="accent1"/>
-          </a:effectRef>
-          <a:fontRef idx="minor">
-            <a:schemeClr val="tx1"/>
-          </a:fontRef>
-        </p:style>
-      </p:cxnSp>
-      <p:sp>
-        <p:nvSpPr>
-          <p:cNvPr id="78" name="Rettangolo 19">
-            <a:extLst>
-              <a:ext uri="{FF2B5EF4-FFF2-40B4-BE49-F238E27FC236}">
-                <a16:creationId xmlns:a16="http://schemas.microsoft.com/office/drawing/2014/main" id="{6BB39E0A-A136-E62C-1CF7-2373DE205B88}"/>
-              </a:ext>
-            </a:extLst>
-          </p:cNvPr>
-          <p:cNvSpPr/>
-          <p:nvPr/>
-        </p:nvSpPr>
-        <p:spPr>
-          <a:xfrm>
-            <a:off x="420370" y="14789114"/>
-            <a:ext cx="7321931" cy="4269344"/>
+            <a:off x="507019" y="10097394"/>
+            <a:ext cx="6318305" cy="3215791"/>
           </a:xfrm>
           <a:prstGeom prst="rect">
             <a:avLst/>
@@ -9188,8 +7983,8 @@
         </p:nvSpPr>
         <p:spPr>
           <a:xfrm>
-            <a:off x="3730057" y="15056363"/>
-            <a:ext cx="1476769" cy="367229"/>
+            <a:off x="2586673" y="10290352"/>
+            <a:ext cx="1476000" cy="367229"/>
           </a:xfrm>
           <a:prstGeom prst="rect">
             <a:avLst/>
@@ -9231,7 +8026,7 @@
                 <a:ea typeface="Fira Code" pitchFamily="1" charset="0"/>
                 <a:cs typeface="Fira Code" pitchFamily="1" charset="0"/>
               </a:rPr>
-              <a:t>4. Generation of model class instance</a:t>
+              <a:t>1. Generation of model class instance</a:t>
             </a:r>
           </a:p>
         </p:txBody>
@@ -9250,8 +8045,8 @@
         </p:nvSpPr>
         <p:spPr>
           <a:xfrm>
-            <a:off x="3735649" y="17229303"/>
-            <a:ext cx="1476774" cy="367229"/>
+            <a:off x="2586673" y="11523523"/>
+            <a:ext cx="1476000" cy="367229"/>
           </a:xfrm>
           <a:prstGeom prst="rect">
             <a:avLst/>
@@ -9293,7 +8088,7 @@
                 <a:ea typeface="Fira Code" pitchFamily="1" charset="0"/>
                 <a:cs typeface="Fira Code" pitchFamily="1" charset="0"/>
               </a:rPr>
-              <a:t>8. Initialization of </a:t>
+              <a:t>3. Initialization of </a:t>
             </a:r>
             <a:br>
               <a:rPr lang="en-US" sz="1063" noProof="1">
@@ -9333,8 +8128,8 @@
         </p:nvSpPr>
         <p:spPr>
           <a:xfrm>
-            <a:off x="2566730" y="16514302"/>
-            <a:ext cx="1476774" cy="367229"/>
+            <a:off x="2586673" y="10913726"/>
+            <a:ext cx="1476000" cy="367229"/>
           </a:xfrm>
           <a:prstGeom prst="rect">
             <a:avLst/>
@@ -9376,7 +8171,7 @@
                 <a:ea typeface="Fira Code" pitchFamily="1" charset="0"/>
                 <a:cs typeface="Fira Code" pitchFamily="1" charset="0"/>
               </a:rPr>
-              <a:t>7. Fill/update exogenous model data</a:t>
+              <a:t>2. Fill/update exogenous model data</a:t>
             </a:r>
           </a:p>
         </p:txBody>
@@ -9395,8 +8190,8 @@
         </p:nvSpPr>
         <p:spPr>
           <a:xfrm>
-            <a:off x="3735648" y="17839100"/>
-            <a:ext cx="1476775" cy="367229"/>
+            <a:off x="2586673" y="12133320"/>
+            <a:ext cx="1476000" cy="367229"/>
           </a:xfrm>
           <a:prstGeom prst="rect">
             <a:avLst/>
@@ -9438,7 +8233,7 @@
                 <a:ea typeface="Fira Code" pitchFamily="1" charset="0"/>
                 <a:cs typeface="Fira Code" pitchFamily="1" charset="0"/>
               </a:rPr>
-              <a:t>9. Solution of numerical problem/s</a:t>
+              <a:t>4. Solution of numerical problem/s</a:t>
             </a:r>
           </a:p>
         </p:txBody>
@@ -9457,8 +8252,8 @@
         </p:nvSpPr>
         <p:spPr>
           <a:xfrm>
-            <a:off x="3735649" y="18448395"/>
-            <a:ext cx="1476774" cy="367229"/>
+            <a:off x="2586673" y="12742615"/>
+            <a:ext cx="1476000" cy="367229"/>
           </a:xfrm>
           <a:prstGeom prst="rect">
             <a:avLst/>
@@ -9500,29 +8295,31 @@
                 <a:ea typeface="Fira Code" pitchFamily="1" charset="0"/>
                 <a:cs typeface="Fira Code" pitchFamily="1" charset="0"/>
               </a:rPr>
-              <a:t>10. Export endogenous model data</a:t>
+              <a:t>5. Export endogenous model data</a:t>
             </a:r>
           </a:p>
         </p:txBody>
       </p:sp>
       <p:cxnSp>
         <p:nvCxnSpPr>
-          <p:cNvPr id="85" name="Connettore diritto 4">
-            <a:extLst>
-              <a:ext uri="{FF2B5EF4-FFF2-40B4-BE49-F238E27FC236}">
-                <a16:creationId xmlns:a16="http://schemas.microsoft.com/office/drawing/2014/main" id="{03F4B7F7-3244-631F-F095-3C72DE175FE2}"/>
+          <p:cNvPr id="89" name="Connettore diritto 4">
+            <a:extLst>
+              <a:ext uri="{FF2B5EF4-FFF2-40B4-BE49-F238E27FC236}">
+                <a16:creationId xmlns:a16="http://schemas.microsoft.com/office/drawing/2014/main" id="{320A796F-0147-7439-040C-1E810FCB1FC2}"/>
               </a:ext>
             </a:extLst>
           </p:cNvPr>
           <p:cNvCxnSpPr>
             <a:cxnSpLocks/>
+            <a:stCxn id="80" idx="2"/>
+            <a:endCxn id="83" idx="0"/>
           </p:cNvCxnSpPr>
           <p:nvPr/>
         </p:nvCxnSpPr>
         <p:spPr>
           <a:xfrm>
-            <a:off x="4662468" y="15423592"/>
-            <a:ext cx="5594" cy="1805711"/>
+            <a:off x="3324673" y="11890752"/>
+            <a:ext cx="0" cy="242568"/>
           </a:xfrm>
           <a:prstGeom prst="line">
             <a:avLst/>
@@ -9550,53 +8347,6 @@
           </a:fontRef>
         </p:style>
       </p:cxnSp>
-      <p:cxnSp>
-        <p:nvCxnSpPr>
-          <p:cNvPr id="89" name="Connettore diritto 4">
-            <a:extLst>
-              <a:ext uri="{FF2B5EF4-FFF2-40B4-BE49-F238E27FC236}">
-                <a16:creationId xmlns:a16="http://schemas.microsoft.com/office/drawing/2014/main" id="{320A796F-0147-7439-040C-1E810FCB1FC2}"/>
-              </a:ext>
-            </a:extLst>
-          </p:cNvPr>
-          <p:cNvCxnSpPr>
-            <a:cxnSpLocks/>
-            <a:stCxn id="80" idx="2"/>
-            <a:endCxn id="83" idx="0"/>
-          </p:cNvCxnSpPr>
-          <p:nvPr/>
-        </p:nvCxnSpPr>
-        <p:spPr>
-          <a:xfrm>
-            <a:off x="4474036" y="17596532"/>
-            <a:ext cx="0" cy="242568"/>
-          </a:xfrm>
-          <a:prstGeom prst="line">
-            <a:avLst/>
-          </a:prstGeom>
-          <a:ln w="12700">
-            <a:solidFill>
-              <a:schemeClr val="tx1"/>
-            </a:solidFill>
-            <a:headEnd type="none" w="med" len="med"/>
-            <a:tailEnd type="triangle" w="med" len="med"/>
-          </a:ln>
-        </p:spPr>
-        <p:style>
-          <a:lnRef idx="1">
-            <a:schemeClr val="accent1"/>
-          </a:lnRef>
-          <a:fillRef idx="0">
-            <a:schemeClr val="accent1"/>
-          </a:fillRef>
-          <a:effectRef idx="0">
-            <a:schemeClr val="accent1"/>
-          </a:effectRef>
-          <a:fontRef idx="minor">
-            <a:schemeClr val="tx1"/>
-          </a:fontRef>
-        </p:style>
-      </p:cxnSp>
       <p:sp>
         <p:nvSpPr>
           <p:cNvPr id="90" name="Rettangolo 19">
@@ -9611,8 +8361,8 @@
         </p:nvSpPr>
         <p:spPr>
           <a:xfrm>
-            <a:off x="5327877" y="15056363"/>
-            <a:ext cx="2191719" cy="367229"/>
+            <a:off x="4410086" y="10357530"/>
+            <a:ext cx="2191719" cy="232872"/>
           </a:xfrm>
           <a:prstGeom prst="rect">
             <a:avLst/>
@@ -9681,8 +8431,8 @@
         </p:nvSpPr>
         <p:spPr>
           <a:xfrm>
-            <a:off x="5327877" y="17847289"/>
-            <a:ext cx="1910853" cy="367229"/>
+            <a:off x="4410086" y="12210277"/>
+            <a:ext cx="1910853" cy="229694"/>
           </a:xfrm>
           <a:prstGeom prst="rect">
             <a:avLst/>
@@ -9751,8 +8501,8 @@
         </p:nvSpPr>
         <p:spPr>
           <a:xfrm>
-            <a:off x="5327877" y="18456585"/>
-            <a:ext cx="2234220" cy="367229"/>
+            <a:off x="4410086" y="12791337"/>
+            <a:ext cx="2234220" cy="286166"/>
           </a:xfrm>
           <a:prstGeom prst="rect">
             <a:avLst/>
@@ -9825,7 +8575,7 @@
         </p:nvCxnSpPr>
         <p:spPr>
           <a:xfrm>
-            <a:off x="4474036" y="18206329"/>
+            <a:off x="3324673" y="12500549"/>
             <a:ext cx="0" cy="242066"/>
           </a:xfrm>
           <a:prstGeom prst="line">
@@ -9870,7 +8620,7 @@
         </p:nvCxnSpPr>
         <p:spPr>
           <a:xfrm>
-            <a:off x="2185000" y="16697917"/>
+            <a:off x="2204943" y="11079810"/>
             <a:ext cx="376137" cy="0"/>
           </a:xfrm>
           <a:prstGeom prst="line">
@@ -9914,8 +8664,8 @@
         </p:nvSpPr>
         <p:spPr>
           <a:xfrm>
-            <a:off x="478814" y="16471513"/>
-            <a:ext cx="1694813" cy="461665"/>
+            <a:off x="591416" y="10848977"/>
+            <a:ext cx="1602154" cy="461665"/>
           </a:xfrm>
           <a:prstGeom prst="rect">
             <a:avLst/>
@@ -9969,7 +8719,7 @@
         </p:nvSpPr>
         <p:spPr>
           <a:xfrm>
-            <a:off x="5327877" y="17326467"/>
+            <a:off x="4410086" y="11620687"/>
             <a:ext cx="2415238" cy="189079"/>
           </a:xfrm>
           <a:prstGeom prst="rect">
@@ -10030,192 +8780,31 @@
           </a:p>
         </p:txBody>
       </p:sp>
-      <p:sp>
-        <p:nvSpPr>
-          <p:cNvPr id="112" name="Rettangolo 19">
-            <a:extLst>
-              <a:ext uri="{FF2B5EF4-FFF2-40B4-BE49-F238E27FC236}">
-                <a16:creationId xmlns:a16="http://schemas.microsoft.com/office/drawing/2014/main" id="{DC2222D9-A18C-B6C5-6C4B-567E0E83FEE9}"/>
-              </a:ext>
-            </a:extLst>
-          </p:cNvPr>
-          <p:cNvSpPr/>
-          <p:nvPr/>
-        </p:nvSpPr>
-        <p:spPr>
-          <a:xfrm>
-            <a:off x="2566730" y="15785575"/>
-            <a:ext cx="1476775" cy="367229"/>
-          </a:xfrm>
-          <a:prstGeom prst="rect">
-            <a:avLst/>
-          </a:prstGeom>
-          <a:noFill/>
-          <a:ln w="12700">
-            <a:solidFill>
-              <a:schemeClr val="tx1"/>
-            </a:solidFill>
-          </a:ln>
-        </p:spPr>
-        <p:style>
-          <a:lnRef idx="2">
-            <a:schemeClr val="accent1">
-              <a:shade val="50000"/>
-            </a:schemeClr>
-          </a:lnRef>
-          <a:fillRef idx="1">
-            <a:schemeClr val="accent1"/>
-          </a:fillRef>
-          <a:effectRef idx="0">
-            <a:schemeClr val="accent1"/>
-          </a:effectRef>
-          <a:fontRef idx="minor">
-            <a:schemeClr val="lt1"/>
-          </a:fontRef>
-        </p:style>
-        <p:txBody>
-          <a:bodyPr rtlCol="0" anchor="ctr"/>
-          <a:lstStyle/>
-          <a:p>
-            <a:pPr algn="ctr"/>
-            <a:r>
-              <a:rPr lang="en-US" sz="1063" noProof="1">
-                <a:solidFill>
-                  <a:schemeClr val="tx1"/>
-                </a:solidFill>
-                <a:latin typeface="+mj-lt"/>
-                <a:ea typeface="Fira Code" pitchFamily="1" charset="0"/>
-                <a:cs typeface="Fira Code" pitchFamily="1" charset="0"/>
-              </a:rPr>
-              <a:t>3. Fill model setup file/s</a:t>
-            </a:r>
-          </a:p>
-        </p:txBody>
-      </p:sp>
       <p:cxnSp>
         <p:nvCxnSpPr>
-          <p:cNvPr id="113" name="Connettore diritto 4">
-            <a:extLst>
-              <a:ext uri="{FF2B5EF4-FFF2-40B4-BE49-F238E27FC236}">
-                <a16:creationId xmlns:a16="http://schemas.microsoft.com/office/drawing/2014/main" id="{B1D40AC2-2087-4576-B679-A25416B6C069}"/>
+          <p:cNvPr id="129" name="Connector: Elbow 128">
+            <a:extLst>
+              <a:ext uri="{FF2B5EF4-FFF2-40B4-BE49-F238E27FC236}">
+                <a16:creationId xmlns:a16="http://schemas.microsoft.com/office/drawing/2014/main" id="{E8FF7700-8A94-06A6-E60C-28F682485EB1}"/>
               </a:ext>
             </a:extLst>
           </p:cNvPr>
           <p:cNvCxnSpPr>
             <a:cxnSpLocks/>
+            <a:stCxn id="79" idx="3"/>
+            <a:endCxn id="83" idx="3"/>
           </p:cNvCxnSpPr>
           <p:nvPr/>
         </p:nvCxnSpPr>
         <p:spPr>
           <a:xfrm>
-            <a:off x="2181094" y="15969191"/>
-            <a:ext cx="376137" cy="0"/>
-          </a:xfrm>
-          <a:prstGeom prst="line">
-            <a:avLst/>
-          </a:prstGeom>
-          <a:ln w="12700">
-            <a:solidFill>
-              <a:schemeClr val="tx1"/>
-            </a:solidFill>
-            <a:prstDash val="sysDash"/>
-            <a:headEnd type="none" w="med" len="med"/>
-            <a:tailEnd type="triangle" w="med" len="med"/>
-          </a:ln>
-        </p:spPr>
-        <p:style>
-          <a:lnRef idx="1">
-            <a:schemeClr val="accent1"/>
-          </a:lnRef>
-          <a:fillRef idx="0">
-            <a:schemeClr val="accent1"/>
-          </a:fillRef>
-          <a:effectRef idx="0">
-            <a:schemeClr val="accent1"/>
-          </a:effectRef>
-          <a:fontRef idx="minor">
-            <a:schemeClr val="tx1"/>
-          </a:fontRef>
-        </p:style>
-      </p:cxnSp>
-      <p:sp>
-        <p:nvSpPr>
-          <p:cNvPr id="114" name="TextBox 113">
-            <a:extLst>
-              <a:ext uri="{FF2B5EF4-FFF2-40B4-BE49-F238E27FC236}">
-                <a16:creationId xmlns:a16="http://schemas.microsoft.com/office/drawing/2014/main" id="{064F0074-7A5C-308D-BA87-67D037042BAD}"/>
-              </a:ext>
-            </a:extLst>
-          </p:cNvPr>
-          <p:cNvSpPr txBox="1"/>
-          <p:nvPr/>
-        </p:nvSpPr>
-        <p:spPr>
-          <a:xfrm>
-            <a:off x="692943" y="15646025"/>
-            <a:ext cx="1476775" cy="646331"/>
-          </a:xfrm>
-          <a:prstGeom prst="rect">
-            <a:avLst/>
-          </a:prstGeom>
-          <a:noFill/>
-        </p:spPr>
-        <p:txBody>
-          <a:bodyPr wrap="square">
-            <a:spAutoFit/>
-          </a:bodyPr>
-          <a:lstStyle/>
-          <a:p>
-            <a:pPr algn="r"/>
-            <a:r>
-              <a:rPr lang="en-US" sz="1200" i="1" noProof="1">
-                <a:solidFill>
-                  <a:schemeClr val="tx1"/>
-                </a:solidFill>
-                <a:latin typeface="+mj-lt"/>
-                <a:ea typeface="Fira Code" pitchFamily="1" charset="0"/>
-                <a:cs typeface="Fira Code" pitchFamily="1" charset="0"/>
-              </a:rPr>
-              <a:t>User data input</a:t>
-            </a:r>
-          </a:p>
-          <a:p>
-            <a:pPr algn="r"/>
-            <a:r>
-              <a:rPr lang="en-US" sz="1200" i="1" noProof="1">
-                <a:latin typeface="+mj-lt"/>
-                <a:ea typeface="Fira Code" pitchFamily="1" charset="0"/>
-                <a:cs typeface="Fira Code" pitchFamily="1" charset="0"/>
-              </a:rPr>
-              <a:t>(only symbolic problem updates)</a:t>
-            </a:r>
-            <a:endParaRPr lang="en-US" sz="1200" i="1" dirty="0"/>
-          </a:p>
-        </p:txBody>
-      </p:sp>
-      <p:cxnSp>
-        <p:nvCxnSpPr>
-          <p:cNvPr id="115" name="Connector: Curved 114">
-            <a:extLst>
-              <a:ext uri="{FF2B5EF4-FFF2-40B4-BE49-F238E27FC236}">
-                <a16:creationId xmlns:a16="http://schemas.microsoft.com/office/drawing/2014/main" id="{3204F44C-60E4-2810-F522-13432ED81217}"/>
-              </a:ext>
-            </a:extLst>
-          </p:cNvPr>
-          <p:cNvCxnSpPr>
-            <a:cxnSpLocks/>
-            <a:stCxn id="81" idx="2"/>
-            <a:endCxn id="80" idx="1"/>
-          </p:cNvCxnSpPr>
-          <p:nvPr/>
-        </p:nvCxnSpPr>
-        <p:spPr>
-          <a:xfrm rot="16200000" flipH="1">
-            <a:off x="3254690" y="16931958"/>
-            <a:ext cx="531387" cy="430532"/>
-          </a:xfrm>
-          <a:prstGeom prst="curvedConnector2">
-            <a:avLst/>
+            <a:off x="4062673" y="10473967"/>
+            <a:ext cx="12700" cy="1842968"/>
+          </a:xfrm>
+          <a:prstGeom prst="bentConnector3">
+            <a:avLst>
+              <a:gd name="adj1" fmla="val 1800000"/>
+            </a:avLst>
           </a:prstGeom>
           <a:ln w="12700">
             <a:solidFill>
@@ -10242,26 +8831,26 @@
       </p:cxnSp>
       <p:cxnSp>
         <p:nvCxnSpPr>
-          <p:cNvPr id="116" name="Connector: Curved 115">
-            <a:extLst>
-              <a:ext uri="{FF2B5EF4-FFF2-40B4-BE49-F238E27FC236}">
-                <a16:creationId xmlns:a16="http://schemas.microsoft.com/office/drawing/2014/main" id="{4DF5127F-794F-164F-86CA-0DB8408D0BEB}"/>
+          <p:cNvPr id="131" name="Connettore diritto 4">
+            <a:extLst>
+              <a:ext uri="{FF2B5EF4-FFF2-40B4-BE49-F238E27FC236}">
+                <a16:creationId xmlns:a16="http://schemas.microsoft.com/office/drawing/2014/main" id="{4A2003E5-7D1F-4BEE-493B-18865BF87924}"/>
               </a:ext>
             </a:extLst>
           </p:cNvPr>
           <p:cNvCxnSpPr>
             <a:cxnSpLocks/>
             <a:stCxn id="79" idx="2"/>
-            <a:endCxn id="112" idx="3"/>
+            <a:endCxn id="81" idx="0"/>
           </p:cNvCxnSpPr>
           <p:nvPr/>
         </p:nvCxnSpPr>
         <p:spPr>
-          <a:xfrm rot="5400000">
-            <a:off x="3983175" y="15483923"/>
-            <a:ext cx="545598" cy="424937"/>
-          </a:xfrm>
-          <a:prstGeom prst="curvedConnector2">
+          <a:xfrm>
+            <a:off x="3324673" y="10657581"/>
+            <a:ext cx="0" cy="256145"/>
+          </a:xfrm>
+          <a:prstGeom prst="line">
             <a:avLst/>
           </a:prstGeom>
           <a:ln w="12700">
@@ -10289,24 +8878,24 @@
       </p:cxnSp>
       <p:cxnSp>
         <p:nvCxnSpPr>
-          <p:cNvPr id="117" name="Connettore diritto 4">
-            <a:extLst>
-              <a:ext uri="{FF2B5EF4-FFF2-40B4-BE49-F238E27FC236}">
-                <a16:creationId xmlns:a16="http://schemas.microsoft.com/office/drawing/2014/main" id="{4F78DC5E-734E-B29E-6226-DE274667A988}"/>
+          <p:cNvPr id="135" name="Connettore diritto 4">
+            <a:extLst>
+              <a:ext uri="{FF2B5EF4-FFF2-40B4-BE49-F238E27FC236}">
+                <a16:creationId xmlns:a16="http://schemas.microsoft.com/office/drawing/2014/main" id="{84615B64-3E23-74E8-D9FC-D7E9CDDA647B}"/>
               </a:ext>
             </a:extLst>
           </p:cNvPr>
           <p:cNvCxnSpPr>
             <a:cxnSpLocks/>
-            <a:stCxn id="112" idx="2"/>
-            <a:endCxn id="81" idx="0"/>
+            <a:stCxn id="81" idx="2"/>
+            <a:endCxn id="80" idx="0"/>
           </p:cNvCxnSpPr>
           <p:nvPr/>
         </p:nvCxnSpPr>
         <p:spPr>
-          <a:xfrm flipH="1">
-            <a:off x="3305117" y="16152804"/>
-            <a:ext cx="1" cy="361498"/>
+          <a:xfrm>
+            <a:off x="3324673" y="11280955"/>
+            <a:ext cx="0" cy="242568"/>
           </a:xfrm>
           <a:prstGeom prst="line">
             <a:avLst/>
@@ -10334,173 +8923,35 @@
           </a:fontRef>
         </p:style>
       </p:cxnSp>
-      <p:cxnSp>
-        <p:nvCxnSpPr>
-          <p:cNvPr id="118" name="Connector: Curved 117">
-            <a:extLst>
-              <a:ext uri="{FF2B5EF4-FFF2-40B4-BE49-F238E27FC236}">
-                <a16:creationId xmlns:a16="http://schemas.microsoft.com/office/drawing/2014/main" id="{30AFFBC5-0847-3356-DECB-BCDD20CE5184}"/>
-              </a:ext>
-            </a:extLst>
-          </p:cNvPr>
-          <p:cNvCxnSpPr>
-            <a:cxnSpLocks/>
-            <a:stCxn id="79" idx="2"/>
-            <a:endCxn id="81" idx="3"/>
-          </p:cNvCxnSpPr>
-          <p:nvPr/>
-        </p:nvCxnSpPr>
-        <p:spPr>
-          <a:xfrm rot="5400000">
-            <a:off x="3618811" y="15848285"/>
-            <a:ext cx="1274325" cy="424938"/>
-          </a:xfrm>
-          <a:prstGeom prst="curvedConnector2">
-            <a:avLst/>
-          </a:prstGeom>
+      <p:sp>
+        <p:nvSpPr>
+          <p:cNvPr id="4" name="Rettangolo 19">
+            <a:extLst>
+              <a:ext uri="{FF2B5EF4-FFF2-40B4-BE49-F238E27FC236}">
+                <a16:creationId xmlns:a16="http://schemas.microsoft.com/office/drawing/2014/main" id="{2B7267A3-029F-8630-570A-62DB4419710D}"/>
+              </a:ext>
+            </a:extLst>
+          </p:cNvPr>
+          <p:cNvSpPr/>
+          <p:nvPr/>
+        </p:nvSpPr>
+        <p:spPr>
+          <a:xfrm>
+            <a:off x="4410086" y="11026243"/>
+            <a:ext cx="2270114" cy="189079"/>
+          </a:xfrm>
+          <a:prstGeom prst="rect">
+            <a:avLst/>
+          </a:prstGeom>
+          <a:noFill/>
           <a:ln w="12700">
-            <a:solidFill>
-              <a:schemeClr val="tx1"/>
-            </a:solidFill>
-            <a:headEnd type="none" w="med" len="med"/>
-            <a:tailEnd type="triangle" w="med" len="med"/>
+            <a:noFill/>
           </a:ln>
-        </p:spPr>
-        <p:style>
-          <a:lnRef idx="1">
-            <a:schemeClr val="accent1"/>
-          </a:lnRef>
-          <a:fillRef idx="0">
-            <a:schemeClr val="accent1"/>
-          </a:fillRef>
-          <a:effectRef idx="0">
-            <a:schemeClr val="accent1"/>
-          </a:effectRef>
-          <a:fontRef idx="minor">
-            <a:schemeClr val="tx1"/>
-          </a:fontRef>
-        </p:style>
-      </p:cxnSp>
-      <p:cxnSp>
-        <p:nvCxnSpPr>
-          <p:cNvPr id="125" name="Connettore diritto 4">
-            <a:extLst>
-              <a:ext uri="{FF2B5EF4-FFF2-40B4-BE49-F238E27FC236}">
-                <a16:creationId xmlns:a16="http://schemas.microsoft.com/office/drawing/2014/main" id="{1D4B58D4-72B5-C350-932D-30051C1D01A7}"/>
-              </a:ext>
-            </a:extLst>
-          </p:cNvPr>
-          <p:cNvCxnSpPr>
-            <a:cxnSpLocks/>
-            <a:stCxn id="38" idx="2"/>
-            <a:endCxn id="25" idx="0"/>
-          </p:cNvCxnSpPr>
-          <p:nvPr/>
-        </p:nvCxnSpPr>
-        <p:spPr>
-          <a:xfrm>
-            <a:off x="4466438" y="10782528"/>
-            <a:ext cx="0" cy="361498"/>
-          </a:xfrm>
-          <a:prstGeom prst="line">
-            <a:avLst/>
-          </a:prstGeom>
-          <a:ln w="12700">
-            <a:solidFill>
-              <a:schemeClr val="tx1"/>
-            </a:solidFill>
-            <a:headEnd type="none" w="med" len="med"/>
-            <a:tailEnd type="triangle" w="med" len="med"/>
-          </a:ln>
-        </p:spPr>
-        <p:style>
-          <a:lnRef idx="1">
-            <a:schemeClr val="accent1"/>
-          </a:lnRef>
-          <a:fillRef idx="0">
-            <a:schemeClr val="accent1"/>
-          </a:fillRef>
-          <a:effectRef idx="0">
-            <a:schemeClr val="accent1"/>
-          </a:effectRef>
-          <a:fontRef idx="minor">
-            <a:schemeClr val="tx1"/>
-          </a:fontRef>
-        </p:style>
-      </p:cxnSp>
-      <p:cxnSp>
-        <p:nvCxnSpPr>
-          <p:cNvPr id="132" name="Connector: Curved 131">
-            <a:extLst>
-              <a:ext uri="{FF2B5EF4-FFF2-40B4-BE49-F238E27FC236}">
-                <a16:creationId xmlns:a16="http://schemas.microsoft.com/office/drawing/2014/main" id="{50EC06DE-AEA2-76EC-5D65-99B655466462}"/>
-              </a:ext>
-            </a:extLst>
-          </p:cNvPr>
-          <p:cNvCxnSpPr>
-            <a:cxnSpLocks/>
-            <a:stCxn id="112" idx="3"/>
-            <a:endCxn id="80" idx="0"/>
-          </p:cNvCxnSpPr>
-          <p:nvPr/>
-        </p:nvCxnSpPr>
-        <p:spPr>
-          <a:xfrm>
-            <a:off x="4043505" y="15969190"/>
-            <a:ext cx="430531" cy="1260113"/>
-          </a:xfrm>
-          <a:prstGeom prst="curvedConnector2">
-            <a:avLst/>
-          </a:prstGeom>
-          <a:ln w="12700">
-            <a:solidFill>
-              <a:schemeClr val="tx1"/>
-            </a:solidFill>
-            <a:headEnd type="none" w="med" len="med"/>
-            <a:tailEnd type="triangle" w="med" len="med"/>
-          </a:ln>
-        </p:spPr>
-        <p:style>
-          <a:lnRef idx="1">
-            <a:schemeClr val="accent1"/>
-          </a:lnRef>
-          <a:fillRef idx="0">
-            <a:schemeClr val="accent1"/>
-          </a:fillRef>
-          <a:effectRef idx="0">
-            <a:schemeClr val="accent1"/>
-          </a:effectRef>
-          <a:fontRef idx="minor">
-            <a:schemeClr val="tx1"/>
-          </a:fontRef>
-        </p:style>
-      </p:cxnSp>
-      <p:sp>
-        <p:nvSpPr>
-          <p:cNvPr id="140" name="Rectangle 139">
-            <a:extLst>
-              <a:ext uri="{FF2B5EF4-FFF2-40B4-BE49-F238E27FC236}">
-                <a16:creationId xmlns:a16="http://schemas.microsoft.com/office/drawing/2014/main" id="{86DD96EE-2D87-9DCA-5974-EFC0D88B9291}"/>
-              </a:ext>
-            </a:extLst>
-          </p:cNvPr>
-          <p:cNvSpPr/>
-          <p:nvPr/>
-        </p:nvSpPr>
-        <p:spPr>
-          <a:xfrm>
-            <a:off x="5054600" y="16235363"/>
-            <a:ext cx="68263" cy="45719"/>
-          </a:xfrm>
-          <a:prstGeom prst="rect">
-            <a:avLst/>
-          </a:prstGeom>
-          <a:noFill/>
         </p:spPr>
         <p:style>
           <a:lnRef idx="2">
             <a:schemeClr val="accent1">
-              <a:shade val="15000"/>
+              <a:shade val="50000"/>
             </a:schemeClr>
           </a:lnRef>
           <a:fillRef idx="1">
@@ -10517,11 +8968,66 @@
           <a:bodyPr rtlCol="0" anchor="ctr"/>
           <a:lstStyle/>
           <a:p>
-            <a:pPr algn="ctr"/>
-            <a:endParaRPr lang="en-US"/>
-          </a:p>
-        </p:txBody>
-      </p:sp>
+            <a:pPr>
+              <a:spcAft>
+                <a:spcPts val="200"/>
+              </a:spcAft>
+            </a:pPr>
+            <a:r>
+              <a:rPr lang="en-US" sz="800" noProof="1">
+                <a:solidFill>
+                  <a:schemeClr val="tx1"/>
+                </a:solidFill>
+                <a:latin typeface="Fira Code" pitchFamily="1" charset="0"/>
+                <a:ea typeface="Fira Code" pitchFamily="1" charset="0"/>
+                <a:cs typeface="Fira Code" pitchFamily="1" charset="0"/>
+              </a:rPr>
+              <a:t>model.</a:t>
+            </a:r>
+            <a:r>
+              <a:rPr lang="en-US" sz="800" b="1" noProof="1">
+                <a:solidFill>
+                  <a:schemeClr val="tx1"/>
+                </a:solidFill>
+                <a:latin typeface="Fira Code" pitchFamily="1" charset="0"/>
+                <a:ea typeface="Fira Code" pitchFamily="1" charset="0"/>
+                <a:cs typeface="Fira Code" pitchFamily="1" charset="0"/>
+              </a:rPr>
+              <a:t>generate_input_data_files()</a:t>
+            </a:r>
+          </a:p>
+        </p:txBody>
+      </p:sp>
+      <p:pic>
+        <p:nvPicPr>
+          <p:cNvPr id="2" name="Picture 1">
+            <a:extLst>
+              <a:ext uri="{FF2B5EF4-FFF2-40B4-BE49-F238E27FC236}">
+                <a16:creationId xmlns:a16="http://schemas.microsoft.com/office/drawing/2014/main" id="{4A86A3B0-3042-8087-4E96-650B93057A2F}"/>
+              </a:ext>
+            </a:extLst>
+          </p:cNvPr>
+          <p:cNvPicPr>
+            <a:picLocks noChangeAspect="1"/>
+          </p:cNvPicPr>
+          <p:nvPr/>
+        </p:nvPicPr>
+        <p:blipFill>
+          <a:blip r:embed="rId3"/>
+          <a:stretch>
+            <a:fillRect/>
+          </a:stretch>
+        </p:blipFill>
+        <p:spPr>
+          <a:xfrm>
+            <a:off x="7320736" y="10097394"/>
+            <a:ext cx="6322100" cy="3218967"/>
+          </a:xfrm>
+          <a:prstGeom prst="rect">
+            <a:avLst/>
+          </a:prstGeom>
+        </p:spPr>
+      </p:pic>
     </p:spTree>
     <p:extLst>
       <p:ext uri="{BB962C8B-B14F-4D97-AF65-F5344CB8AC3E}">

</xml_diff>

<commit_message>
Advancing package documentation. Work in progress.
</commit_message>
<xml_diff>
--- a/docs/images/flowchart.pptx
+++ b/docs/images/flowchart.pptx
@@ -7,6 +7,7 @@
   <p:sldIdLst>
     <p:sldId id="256" r:id="rId2"/>
     <p:sldId id="259" r:id="rId3"/>
+    <p:sldId id="1814" r:id="rId4"/>
   </p:sldIdLst>
   <p:sldSz cx="14400213" cy="21599525"/>
   <p:notesSz cx="6858000" cy="9144000"/>
@@ -244,7 +245,7 @@
           <a:p>
             <a:fld id="{C4BA104D-BBF9-4279-8CEB-A5CF88D2DFAC}" type="datetimeFigureOut">
               <a:rPr lang="en-US" smtClean="0"/>
-              <a:t>10/3/2025</a:t>
+              <a:t>10/15/2025</a:t>
             </a:fld>
             <a:endParaRPr lang="en-US"/>
           </a:p>
@@ -414,7 +415,7 @@
           <a:p>
             <a:fld id="{C4BA104D-BBF9-4279-8CEB-A5CF88D2DFAC}" type="datetimeFigureOut">
               <a:rPr lang="en-US" smtClean="0"/>
-              <a:t>10/3/2025</a:t>
+              <a:t>10/15/2025</a:t>
             </a:fld>
             <a:endParaRPr lang="en-US"/>
           </a:p>
@@ -594,7 +595,7 @@
           <a:p>
             <a:fld id="{C4BA104D-BBF9-4279-8CEB-A5CF88D2DFAC}" type="datetimeFigureOut">
               <a:rPr lang="en-US" smtClean="0"/>
-              <a:t>10/3/2025</a:t>
+              <a:t>10/15/2025</a:t>
             </a:fld>
             <a:endParaRPr lang="en-US"/>
           </a:p>
@@ -646,6 +647,136 @@
     <p:extLst>
       <p:ext uri="{BB962C8B-B14F-4D97-AF65-F5344CB8AC3E}">
         <p14:creationId xmlns:p14="http://schemas.microsoft.com/office/powerpoint/2010/main" val="3691304870"/>
+      </p:ext>
+    </p:extLst>
+  </p:cSld>
+  <p:clrMapOvr>
+    <a:masterClrMapping/>
+  </p:clrMapOvr>
+</p:sldLayout>
+</file>
+
+<file path=ppt/slideLayouts/slideLayout12.xml><?xml version="1.0" encoding="utf-8"?>
+<p:sldLayout xmlns:a="http://schemas.openxmlformats.org/drawingml/2006/main" xmlns:r="http://schemas.openxmlformats.org/officeDocument/2006/relationships" xmlns:p="http://schemas.openxmlformats.org/presentationml/2006/main" userDrawn="1">
+  <p:cSld name="Title_Subtitle">
+    <p:spTree>
+      <p:nvGrpSpPr>
+        <p:cNvPr id="1" name=""/>
+        <p:cNvGrpSpPr/>
+        <p:nvPr/>
+      </p:nvGrpSpPr>
+      <p:grpSpPr>
+        <a:xfrm>
+          <a:off x="0" y="0"/>
+          <a:ext cx="0" cy="0"/>
+          <a:chOff x="0" y="0"/>
+          <a:chExt cx="0" cy="0"/>
+        </a:xfrm>
+      </p:grpSpPr>
+      <p:sp>
+        <p:nvSpPr>
+          <p:cNvPr id="13" name="Title Placeholder 1">
+            <a:extLst>
+              <a:ext uri="{FF2B5EF4-FFF2-40B4-BE49-F238E27FC236}">
+                <a16:creationId xmlns:a16="http://schemas.microsoft.com/office/drawing/2014/main" id="{F8C06533-D1E3-4DC7-B089-73214B10259A}"/>
+              </a:ext>
+            </a:extLst>
+          </p:cNvPr>
+          <p:cNvSpPr>
+            <a:spLocks noGrp="1"/>
+          </p:cNvSpPr>
+          <p:nvPr>
+            <p:ph type="title"/>
+          </p:nvPr>
+        </p:nvSpPr>
+        <p:spPr>
+          <a:xfrm>
+            <a:off x="261822" y="510003"/>
+            <a:ext cx="13887477" cy="1089963"/>
+          </a:xfrm>
+          <a:prstGeom prst="rect">
+            <a:avLst/>
+          </a:prstGeom>
+        </p:spPr>
+        <p:txBody>
+          <a:bodyPr vert="horz" lIns="91440" tIns="45720" rIns="91440" bIns="45720" rtlCol="0" anchor="t">
+            <a:normAutofit/>
+          </a:bodyPr>
+          <a:lstStyle>
+            <a:lvl1pPr>
+              <a:defRPr/>
+            </a:lvl1pPr>
+          </a:lstStyle>
+          <a:p>
+            <a:r>
+              <a:rPr lang="en-US"/>
+              <a:t>Click to edit Master title style</a:t>
+            </a:r>
+            <a:endParaRPr lang="en-GB"/>
+          </a:p>
+        </p:txBody>
+      </p:sp>
+      <p:sp>
+        <p:nvSpPr>
+          <p:cNvPr id="19" name="Text Placeholder 2">
+            <a:extLst>
+              <a:ext uri="{FF2B5EF4-FFF2-40B4-BE49-F238E27FC236}">
+                <a16:creationId xmlns:a16="http://schemas.microsoft.com/office/drawing/2014/main" id="{F3432F0C-18AF-4D0B-A854-38CA1B6120DC}"/>
+              </a:ext>
+            </a:extLst>
+          </p:cNvPr>
+          <p:cNvSpPr>
+            <a:spLocks noGrp="1"/>
+          </p:cNvSpPr>
+          <p:nvPr>
+            <p:ph idx="10"/>
+          </p:nvPr>
+        </p:nvSpPr>
+        <p:spPr>
+          <a:xfrm>
+            <a:off x="261822" y="2181783"/>
+            <a:ext cx="13887477" cy="1784046"/>
+          </a:xfrm>
+          <a:prstGeom prst="rect">
+            <a:avLst/>
+          </a:prstGeom>
+        </p:spPr>
+        <p:txBody>
+          <a:bodyPr vert="horz" lIns="91440" tIns="45720" rIns="91440" bIns="45720" rtlCol="0">
+            <a:normAutofit/>
+          </a:bodyPr>
+          <a:lstStyle>
+            <a:lvl1pPr marL="0" algn="l" defTabSz="1079998" rtl="0" eaLnBrk="1" latinLnBrk="0" hangingPunct="1">
+              <a:lnSpc>
+                <a:spcPct val="90000"/>
+              </a:lnSpc>
+              <a:spcBef>
+                <a:spcPct val="0"/>
+              </a:spcBef>
+              <a:buNone/>
+              <a:defRPr lang="en-US" sz="2835" b="1" kern="1200" dirty="0" smtClean="0">
+                <a:solidFill>
+                  <a:srgbClr val="728FA5"/>
+                </a:solidFill>
+                <a:latin typeface="+mj-lt"/>
+                <a:ea typeface="+mj-ea"/>
+                <a:cs typeface="+mj-cs"/>
+              </a:defRPr>
+            </a:lvl1pPr>
+          </a:lstStyle>
+          <a:p>
+            <a:pPr lvl="0"/>
+            <a:r>
+              <a:rPr lang="en-US"/>
+              <a:t>Click to edit Master text styles</a:t>
+            </a:r>
+          </a:p>
+        </p:txBody>
+      </p:sp>
+    </p:spTree>
+    <p:extLst>
+      <p:ext uri="{BB962C8B-B14F-4D97-AF65-F5344CB8AC3E}">
+        <p14:creationId xmlns:p14="http://schemas.microsoft.com/office/powerpoint/2010/main" val="99066544"/>
       </p:ext>
     </p:extLst>
   </p:cSld>
@@ -764,7 +895,7 @@
           <a:p>
             <a:fld id="{C4BA104D-BBF9-4279-8CEB-A5CF88D2DFAC}" type="datetimeFigureOut">
               <a:rPr lang="en-US" smtClean="0"/>
-              <a:t>10/3/2025</a:t>
+              <a:t>10/15/2025</a:t>
             </a:fld>
             <a:endParaRPr lang="en-US"/>
           </a:p>
@@ -1010,7 +1141,7 @@
           <a:p>
             <a:fld id="{C4BA104D-BBF9-4279-8CEB-A5CF88D2DFAC}" type="datetimeFigureOut">
               <a:rPr lang="en-US" smtClean="0"/>
-              <a:t>10/3/2025</a:t>
+              <a:t>10/15/2025</a:t>
             </a:fld>
             <a:endParaRPr lang="en-US"/>
           </a:p>
@@ -1242,7 +1373,7 @@
           <a:p>
             <a:fld id="{C4BA104D-BBF9-4279-8CEB-A5CF88D2DFAC}" type="datetimeFigureOut">
               <a:rPr lang="en-US" smtClean="0"/>
-              <a:t>10/3/2025</a:t>
+              <a:t>10/15/2025</a:t>
             </a:fld>
             <a:endParaRPr lang="en-US"/>
           </a:p>
@@ -1609,7 +1740,7 @@
           <a:p>
             <a:fld id="{C4BA104D-BBF9-4279-8CEB-A5CF88D2DFAC}" type="datetimeFigureOut">
               <a:rPr lang="en-US" smtClean="0"/>
-              <a:t>10/3/2025</a:t>
+              <a:t>10/15/2025</a:t>
             </a:fld>
             <a:endParaRPr lang="en-US"/>
           </a:p>
@@ -1727,7 +1858,7 @@
           <a:p>
             <a:fld id="{C4BA104D-BBF9-4279-8CEB-A5CF88D2DFAC}" type="datetimeFigureOut">
               <a:rPr lang="en-US" smtClean="0"/>
-              <a:t>10/3/2025</a:t>
+              <a:t>10/15/2025</a:t>
             </a:fld>
             <a:endParaRPr lang="en-US"/>
           </a:p>
@@ -1822,7 +1953,7 @@
           <a:p>
             <a:fld id="{C4BA104D-BBF9-4279-8CEB-A5CF88D2DFAC}" type="datetimeFigureOut">
               <a:rPr lang="en-US" smtClean="0"/>
-              <a:t>10/3/2025</a:t>
+              <a:t>10/15/2025</a:t>
             </a:fld>
             <a:endParaRPr lang="en-US"/>
           </a:p>
@@ -2099,7 +2230,7 @@
           <a:p>
             <a:fld id="{C4BA104D-BBF9-4279-8CEB-A5CF88D2DFAC}" type="datetimeFigureOut">
               <a:rPr lang="en-US" smtClean="0"/>
-              <a:t>10/3/2025</a:t>
+              <a:t>10/15/2025</a:t>
             </a:fld>
             <a:endParaRPr lang="en-US"/>
           </a:p>
@@ -2356,7 +2487,7 @@
           <a:p>
             <a:fld id="{C4BA104D-BBF9-4279-8CEB-A5CF88D2DFAC}" type="datetimeFigureOut">
               <a:rPr lang="en-US" smtClean="0"/>
-              <a:t>10/3/2025</a:t>
+              <a:t>10/15/2025</a:t>
             </a:fld>
             <a:endParaRPr lang="en-US"/>
           </a:p>
@@ -2569,7 +2700,7 @@
           <a:p>
             <a:fld id="{C4BA104D-BBF9-4279-8CEB-A5CF88D2DFAC}" type="datetimeFigureOut">
               <a:rPr lang="en-US" smtClean="0"/>
-              <a:t>10/3/2025</a:t>
+              <a:t>10/15/2025</a:t>
             </a:fld>
             <a:endParaRPr lang="en-US"/>
           </a:p>
@@ -2673,6 +2804,7 @@
     <p:sldLayoutId id="2147483669" r:id="rId9"/>
     <p:sldLayoutId id="2147483670" r:id="rId10"/>
     <p:sldLayoutId id="2147483671" r:id="rId11"/>
+    <p:sldLayoutId id="2147483672" r:id="rId12"/>
   </p:sldLayoutIdLst>
   <p:txStyles>
     <p:titleStyle>
@@ -9032,6 +9164,815 @@
     <p:extLst>
       <p:ext uri="{BB962C8B-B14F-4D97-AF65-F5344CB8AC3E}">
         <p14:creationId xmlns:p14="http://schemas.microsoft.com/office/powerpoint/2010/main" val="4639490"/>
+      </p:ext>
+    </p:extLst>
+  </p:cSld>
+  <p:clrMapOvr>
+    <a:masterClrMapping/>
+  </p:clrMapOvr>
+</p:sld>
+</file>
+
+<file path=ppt/slides/slide3.xml><?xml version="1.0" encoding="utf-8"?>
+<p:sld xmlns:a="http://schemas.openxmlformats.org/drawingml/2006/main" xmlns:r="http://schemas.openxmlformats.org/officeDocument/2006/relationships" xmlns:p="http://schemas.openxmlformats.org/presentationml/2006/main">
+  <p:cSld>
+    <p:spTree>
+      <p:nvGrpSpPr>
+        <p:cNvPr id="1" name="">
+          <a:extLst>
+            <a:ext uri="{FF2B5EF4-FFF2-40B4-BE49-F238E27FC236}">
+              <a16:creationId xmlns:a16="http://schemas.microsoft.com/office/drawing/2014/main" id="{28DEAC00-52F2-1CAC-98A2-6723B1C2EC5F}"/>
+            </a:ext>
+          </a:extLst>
+        </p:cNvPr>
+        <p:cNvGrpSpPr/>
+        <p:nvPr/>
+      </p:nvGrpSpPr>
+      <p:grpSpPr>
+        <a:xfrm>
+          <a:off x="0" y="0"/>
+          <a:ext cx="0" cy="0"/>
+          <a:chOff x="0" y="0"/>
+          <a:chExt cx="0" cy="0"/>
+        </a:xfrm>
+      </p:grpSpPr>
+      <p:sp>
+        <p:nvSpPr>
+          <p:cNvPr id="74" name="Rettangolo 19">
+            <a:extLst>
+              <a:ext uri="{FF2B5EF4-FFF2-40B4-BE49-F238E27FC236}">
+                <a16:creationId xmlns:a16="http://schemas.microsoft.com/office/drawing/2014/main" id="{171A7456-C984-AB17-8AF1-007916D507C2}"/>
+              </a:ext>
+            </a:extLst>
+          </p:cNvPr>
+          <p:cNvSpPr/>
+          <p:nvPr/>
+        </p:nvSpPr>
+        <p:spPr>
+          <a:xfrm>
+            <a:off x="2049247" y="4222466"/>
+            <a:ext cx="10025913" cy="4007127"/>
+          </a:xfrm>
+          <a:prstGeom prst="rect">
+            <a:avLst/>
+          </a:prstGeom>
+          <a:solidFill>
+            <a:schemeClr val="bg1">
+              <a:lumMod val="95000"/>
+            </a:schemeClr>
+          </a:solidFill>
+          <a:ln w="12700">
+            <a:noFill/>
+          </a:ln>
+        </p:spPr>
+        <p:style>
+          <a:lnRef idx="2">
+            <a:schemeClr val="accent1">
+              <a:shade val="50000"/>
+            </a:schemeClr>
+          </a:lnRef>
+          <a:fillRef idx="1">
+            <a:schemeClr val="accent1"/>
+          </a:fillRef>
+          <a:effectRef idx="0">
+            <a:schemeClr val="accent1"/>
+          </a:effectRef>
+          <a:fontRef idx="minor">
+            <a:schemeClr val="lt1"/>
+          </a:fontRef>
+        </p:style>
+        <p:txBody>
+          <a:bodyPr rtlCol="0" anchor="ctr"/>
+          <a:lstStyle/>
+          <a:p>
+            <a:pPr algn="ctr"/>
+            <a:endParaRPr lang="en-US" sz="1256" noProof="1">
+              <a:solidFill>
+                <a:schemeClr val="tx1"/>
+              </a:solidFill>
+              <a:latin typeface="+mj-lt"/>
+              <a:ea typeface="Fira Code" pitchFamily="1" charset="0"/>
+              <a:cs typeface="Fira Code" pitchFamily="1" charset="0"/>
+            </a:endParaRPr>
+          </a:p>
+        </p:txBody>
+      </p:sp>
+      <p:sp>
+        <p:nvSpPr>
+          <p:cNvPr id="8" name="TextBox 7">
+            <a:extLst>
+              <a:ext uri="{FF2B5EF4-FFF2-40B4-BE49-F238E27FC236}">
+                <a16:creationId xmlns:a16="http://schemas.microsoft.com/office/drawing/2014/main" id="{12253348-BAF1-207A-6C49-A92BEAFEC1DC}"/>
+              </a:ext>
+            </a:extLst>
+          </p:cNvPr>
+          <p:cNvSpPr txBox="1"/>
+          <p:nvPr/>
+        </p:nvSpPr>
+        <p:spPr>
+          <a:xfrm>
+            <a:off x="2185973" y="7023857"/>
+            <a:ext cx="1631498" cy="856004"/>
+          </a:xfrm>
+          <a:prstGeom prst="rect">
+            <a:avLst/>
+          </a:prstGeom>
+          <a:noFill/>
+        </p:spPr>
+        <p:txBody>
+          <a:bodyPr wrap="square">
+            <a:spAutoFit/>
+          </a:bodyPr>
+          <a:lstStyle/>
+          <a:p>
+            <a:pPr algn="ctr"/>
+            <a:r>
+              <a:rPr lang="en-US" sz="1654" i="1" noProof="1"/>
+              <a:t>Define model settings and structure</a:t>
+            </a:r>
+          </a:p>
+        </p:txBody>
+      </p:sp>
+      <p:sp>
+        <p:nvSpPr>
+          <p:cNvPr id="11" name="TextBox 10">
+            <a:extLst>
+              <a:ext uri="{FF2B5EF4-FFF2-40B4-BE49-F238E27FC236}">
+                <a16:creationId xmlns:a16="http://schemas.microsoft.com/office/drawing/2014/main" id="{FC14D916-996B-4E5A-21AE-978504C6B82E}"/>
+              </a:ext>
+            </a:extLst>
+          </p:cNvPr>
+          <p:cNvSpPr txBox="1"/>
+          <p:nvPr/>
+        </p:nvSpPr>
+        <p:spPr>
+          <a:xfrm>
+            <a:off x="9235922" y="4520894"/>
+            <a:ext cx="2157624" cy="856004"/>
+          </a:xfrm>
+          <a:prstGeom prst="rect">
+            <a:avLst/>
+          </a:prstGeom>
+          <a:noFill/>
+        </p:spPr>
+        <p:txBody>
+          <a:bodyPr wrap="square">
+            <a:spAutoFit/>
+          </a:bodyPr>
+          <a:lstStyle/>
+          <a:p>
+            <a:r>
+              <a:rPr lang="en-US" sz="1654" i="1" noProof="1"/>
+              <a:t>Generate model database, feed / update input data</a:t>
+            </a:r>
+          </a:p>
+        </p:txBody>
+      </p:sp>
+      <p:pic>
+        <p:nvPicPr>
+          <p:cNvPr id="13" name="Picture 18" descr="SQLite logo vector (.EPS) - Anthon Code">
+            <a:extLst>
+              <a:ext uri="{FF2B5EF4-FFF2-40B4-BE49-F238E27FC236}">
+                <a16:creationId xmlns:a16="http://schemas.microsoft.com/office/drawing/2014/main" id="{0435C665-5EBA-265E-008C-EE9AD39398A7}"/>
+              </a:ext>
+            </a:extLst>
+          </p:cNvPr>
+          <p:cNvPicPr>
+            <a:picLocks noChangeAspect="1" noChangeArrowheads="1"/>
+          </p:cNvPicPr>
+          <p:nvPr/>
+        </p:nvPicPr>
+        <p:blipFill>
+          <a:blip r:embed="rId2">
+            <a:extLst>
+              <a:ext uri="{28A0092B-C50C-407E-A947-70E740481C1C}">
+                <a14:useLocalDpi xmlns:a14="http://schemas.microsoft.com/office/drawing/2010/main" val="0"/>
+              </a:ext>
+            </a:extLst>
+          </a:blip>
+          <a:srcRect/>
+          <a:stretch>
+            <a:fillRect/>
+          </a:stretch>
+        </p:blipFill>
+        <p:spPr bwMode="auto">
+          <a:xfrm>
+            <a:off x="6881933" y="4374296"/>
+            <a:ext cx="2204752" cy="1041133"/>
+          </a:xfrm>
+          <a:prstGeom prst="rect">
+            <a:avLst/>
+          </a:prstGeom>
+          <a:noFill/>
+          <a:extLst>
+            <a:ext uri="{909E8E84-426E-40DD-AFC4-6F175D3DCCD1}">
+              <a14:hiddenFill xmlns:a14="http://schemas.microsoft.com/office/drawing/2010/main">
+                <a:solidFill>
+                  <a:srgbClr val="FFFFFF"/>
+                </a:solidFill>
+              </a14:hiddenFill>
+            </a:ext>
+          </a:extLst>
+        </p:spPr>
+      </p:pic>
+      <p:pic>
+        <p:nvPicPr>
+          <p:cNvPr id="31" name="Picture 4" descr="Math icon">
+            <a:hlinkClick r:id="rId3" tooltip="Math icon"/>
+            <a:extLst>
+              <a:ext uri="{FF2B5EF4-FFF2-40B4-BE49-F238E27FC236}">
+                <a16:creationId xmlns:a16="http://schemas.microsoft.com/office/drawing/2014/main" id="{27DAAD24-622F-BF79-4DB0-207F02166E5D}"/>
+              </a:ext>
+            </a:extLst>
+          </p:cNvPr>
+          <p:cNvPicPr>
+            <a:picLocks noChangeAspect="1" noChangeArrowheads="1"/>
+          </p:cNvPicPr>
+          <p:nvPr/>
+        </p:nvPicPr>
+        <p:blipFill>
+          <a:blip r:embed="rId4">
+            <a:extLst>
+              <a:ext uri="{28A0092B-C50C-407E-A947-70E740481C1C}">
+                <a14:useLocalDpi xmlns:a14="http://schemas.microsoft.com/office/drawing/2010/main" val="0"/>
+              </a:ext>
+            </a:extLst>
+          </a:blip>
+          <a:srcRect/>
+          <a:stretch>
+            <a:fillRect/>
+          </a:stretch>
+        </p:blipFill>
+        <p:spPr bwMode="auto">
+          <a:xfrm>
+            <a:off x="2568880" y="5695111"/>
+            <a:ext cx="979015" cy="979015"/>
+          </a:xfrm>
+          <a:prstGeom prst="rect">
+            <a:avLst/>
+          </a:prstGeom>
+          <a:noFill/>
+          <a:extLst>
+            <a:ext uri="{909E8E84-426E-40DD-AFC4-6F175D3DCCD1}">
+              <a14:hiddenFill xmlns:a14="http://schemas.microsoft.com/office/drawing/2010/main">
+                <a:solidFill>
+                  <a:srgbClr val="FFFFFF"/>
+                </a:solidFill>
+              </a14:hiddenFill>
+            </a:ext>
+          </a:extLst>
+        </p:spPr>
+      </p:pic>
+      <p:cxnSp>
+        <p:nvCxnSpPr>
+          <p:cNvPr id="34" name="Straight Arrow Connector 33">
+            <a:extLst>
+              <a:ext uri="{FF2B5EF4-FFF2-40B4-BE49-F238E27FC236}">
+                <a16:creationId xmlns:a16="http://schemas.microsoft.com/office/drawing/2014/main" id="{EF833666-9AD5-E841-A21E-F5C1E015E722}"/>
+              </a:ext>
+            </a:extLst>
+          </p:cNvPr>
+          <p:cNvCxnSpPr>
+            <a:cxnSpLocks/>
+          </p:cNvCxnSpPr>
+          <p:nvPr/>
+        </p:nvCxnSpPr>
+        <p:spPr>
+          <a:xfrm flipH="1">
+            <a:off x="3684772" y="6184618"/>
+            <a:ext cx="779578" cy="0"/>
+          </a:xfrm>
+          <a:prstGeom prst="straightConnector1">
+            <a:avLst/>
+          </a:prstGeom>
+          <a:ln w="25400">
+            <a:solidFill>
+              <a:schemeClr val="tx1"/>
+            </a:solidFill>
+            <a:headEnd type="arrow" w="med" len="med"/>
+            <a:tailEnd type="none" w="med" len="med"/>
+          </a:ln>
+        </p:spPr>
+        <p:style>
+          <a:lnRef idx="1">
+            <a:schemeClr val="accent1"/>
+          </a:lnRef>
+          <a:fillRef idx="0">
+            <a:schemeClr val="accent1"/>
+          </a:fillRef>
+          <a:effectRef idx="0">
+            <a:schemeClr val="accent1"/>
+          </a:effectRef>
+          <a:fontRef idx="minor">
+            <a:schemeClr val="tx1"/>
+          </a:fontRef>
+        </p:style>
+      </p:cxnSp>
+      <p:sp>
+        <p:nvSpPr>
+          <p:cNvPr id="36" name="Left Brace 35">
+            <a:extLst>
+              <a:ext uri="{FF2B5EF4-FFF2-40B4-BE49-F238E27FC236}">
+                <a16:creationId xmlns:a16="http://schemas.microsoft.com/office/drawing/2014/main" id="{CF3044C6-79CE-EAD2-C432-CD393B0BBDFE}"/>
+              </a:ext>
+            </a:extLst>
+          </p:cNvPr>
+          <p:cNvSpPr/>
+          <p:nvPr/>
+        </p:nvSpPr>
+        <p:spPr>
+          <a:xfrm>
+            <a:off x="6207010" y="4722301"/>
+            <a:ext cx="394035" cy="2924634"/>
+          </a:xfrm>
+          <a:prstGeom prst="leftBrace">
+            <a:avLst/>
+          </a:prstGeom>
+          <a:ln w="28575">
+            <a:solidFill>
+              <a:schemeClr val="tx1"/>
+            </a:solidFill>
+          </a:ln>
+        </p:spPr>
+        <p:style>
+          <a:lnRef idx="1">
+            <a:schemeClr val="accent1"/>
+          </a:lnRef>
+          <a:fillRef idx="0">
+            <a:schemeClr val="accent1"/>
+          </a:fillRef>
+          <a:effectRef idx="0">
+            <a:schemeClr val="accent1"/>
+          </a:effectRef>
+          <a:fontRef idx="minor">
+            <a:schemeClr val="tx1"/>
+          </a:fontRef>
+        </p:style>
+        <p:txBody>
+          <a:bodyPr rtlCol="0" anchor="ctr"/>
+          <a:lstStyle/>
+          <a:p>
+            <a:pPr algn="ctr"/>
+            <a:endParaRPr lang="en-US" sz="2126"/>
+          </a:p>
+        </p:txBody>
+      </p:sp>
+      <p:sp>
+        <p:nvSpPr>
+          <p:cNvPr id="40" name="TextBox 39">
+            <a:extLst>
+              <a:ext uri="{FF2B5EF4-FFF2-40B4-BE49-F238E27FC236}">
+                <a16:creationId xmlns:a16="http://schemas.microsoft.com/office/drawing/2014/main" id="{D6862556-E2A3-E5C7-B27A-8C2AB1925930}"/>
+              </a:ext>
+            </a:extLst>
+          </p:cNvPr>
+          <p:cNvSpPr txBox="1"/>
+          <p:nvPr/>
+        </p:nvSpPr>
+        <p:spPr>
+          <a:xfrm>
+            <a:off x="9277275" y="7209551"/>
+            <a:ext cx="2116271" cy="601447"/>
+          </a:xfrm>
+          <a:prstGeom prst="rect">
+            <a:avLst/>
+          </a:prstGeom>
+          <a:noFill/>
+        </p:spPr>
+        <p:txBody>
+          <a:bodyPr wrap="square">
+            <a:spAutoFit/>
+          </a:bodyPr>
+          <a:lstStyle/>
+          <a:p>
+            <a:r>
+              <a:rPr lang="en-US" sz="1654" i="1" noProof="1"/>
+              <a:t>Export, explore and visualize results</a:t>
+            </a:r>
+          </a:p>
+        </p:txBody>
+      </p:sp>
+      <p:sp>
+        <p:nvSpPr>
+          <p:cNvPr id="41" name="TextBox 40">
+            <a:extLst>
+              <a:ext uri="{FF2B5EF4-FFF2-40B4-BE49-F238E27FC236}">
+                <a16:creationId xmlns:a16="http://schemas.microsoft.com/office/drawing/2014/main" id="{26021FEB-EDBF-CDE6-45EF-4069FCF7CA82}"/>
+              </a:ext>
+            </a:extLst>
+          </p:cNvPr>
+          <p:cNvSpPr txBox="1"/>
+          <p:nvPr/>
+        </p:nvSpPr>
+        <p:spPr>
+          <a:xfrm>
+            <a:off x="9235922" y="5957789"/>
+            <a:ext cx="2043533" cy="601447"/>
+          </a:xfrm>
+          <a:prstGeom prst="rect">
+            <a:avLst/>
+          </a:prstGeom>
+          <a:noFill/>
+        </p:spPr>
+        <p:txBody>
+          <a:bodyPr wrap="square">
+            <a:spAutoFit/>
+          </a:bodyPr>
+          <a:lstStyle/>
+          <a:p>
+            <a:r>
+              <a:rPr lang="en-US" sz="1654" i="1" noProof="1"/>
+              <a:t>Generate and solve numerical problem</a:t>
+            </a:r>
+          </a:p>
+        </p:txBody>
+      </p:sp>
+      <p:cxnSp>
+        <p:nvCxnSpPr>
+          <p:cNvPr id="42" name="Connector: Elbow 41">
+            <a:extLst>
+              <a:ext uri="{FF2B5EF4-FFF2-40B4-BE49-F238E27FC236}">
+                <a16:creationId xmlns:a16="http://schemas.microsoft.com/office/drawing/2014/main" id="{99C9E6F2-EAEF-E177-2654-0A0FE4525C37}"/>
+              </a:ext>
+            </a:extLst>
+          </p:cNvPr>
+          <p:cNvCxnSpPr>
+            <a:cxnSpLocks/>
+            <a:stCxn id="11" idx="3"/>
+            <a:endCxn id="40" idx="3"/>
+          </p:cNvCxnSpPr>
+          <p:nvPr/>
+        </p:nvCxnSpPr>
+        <p:spPr>
+          <a:xfrm>
+            <a:off x="11393546" y="4948896"/>
+            <a:ext cx="12700" cy="2561379"/>
+          </a:xfrm>
+          <a:prstGeom prst="bentConnector3">
+            <a:avLst>
+              <a:gd name="adj1" fmla="val 1800000"/>
+            </a:avLst>
+          </a:prstGeom>
+          <a:ln w="25400">
+            <a:solidFill>
+              <a:schemeClr val="tx1"/>
+            </a:solidFill>
+            <a:headEnd type="arrow" w="med" len="med"/>
+            <a:tailEnd type="none" w="med" len="med"/>
+          </a:ln>
+        </p:spPr>
+        <p:style>
+          <a:lnRef idx="1">
+            <a:schemeClr val="accent1"/>
+          </a:lnRef>
+          <a:fillRef idx="0">
+            <a:schemeClr val="accent1"/>
+          </a:fillRef>
+          <a:effectRef idx="0">
+            <a:schemeClr val="accent1"/>
+          </a:effectRef>
+          <a:fontRef idx="minor">
+            <a:schemeClr val="tx1"/>
+          </a:fontRef>
+        </p:style>
+      </p:cxnSp>
+      <p:pic>
+        <p:nvPicPr>
+          <p:cNvPr id="1029" name="Picture 5" descr="Install">
+            <a:extLst>
+              <a:ext uri="{FF2B5EF4-FFF2-40B4-BE49-F238E27FC236}">
+                <a16:creationId xmlns:a16="http://schemas.microsoft.com/office/drawing/2014/main" id="{5FEE0BB3-60B6-7093-B786-AA606123336B}"/>
+              </a:ext>
+            </a:extLst>
+          </p:cNvPr>
+          <p:cNvPicPr>
+            <a:picLocks noChangeAspect="1" noChangeArrowheads="1"/>
+          </p:cNvPicPr>
+          <p:nvPr/>
+        </p:nvPicPr>
+        <p:blipFill>
+          <a:blip r:embed="rId5">
+            <a:extLst>
+              <a:ext uri="{28A0092B-C50C-407E-A947-70E740481C1C}">
+                <a14:useLocalDpi xmlns:a14="http://schemas.microsoft.com/office/drawing/2010/main" val="0"/>
+              </a:ext>
+            </a:extLst>
+          </a:blip>
+          <a:srcRect/>
+          <a:stretch>
+            <a:fillRect/>
+          </a:stretch>
+        </p:blipFill>
+        <p:spPr bwMode="auto">
+          <a:xfrm>
+            <a:off x="6990067" y="6034978"/>
+            <a:ext cx="2038882" cy="437749"/>
+          </a:xfrm>
+          <a:prstGeom prst="rect">
+            <a:avLst/>
+          </a:prstGeom>
+          <a:noFill/>
+          <a:extLst>
+            <a:ext uri="{909E8E84-426E-40DD-AFC4-6F175D3DCCD1}">
+              <a14:hiddenFill xmlns:a14="http://schemas.microsoft.com/office/drawing/2010/main">
+                <a:solidFill>
+                  <a:srgbClr val="FFFFFF"/>
+                </a:solidFill>
+              </a14:hiddenFill>
+            </a:ext>
+          </a:extLst>
+        </p:spPr>
+      </p:pic>
+      <p:cxnSp>
+        <p:nvCxnSpPr>
+          <p:cNvPr id="2" name="Straight Arrow Connector 1">
+            <a:extLst>
+              <a:ext uri="{FF2B5EF4-FFF2-40B4-BE49-F238E27FC236}">
+                <a16:creationId xmlns:a16="http://schemas.microsoft.com/office/drawing/2014/main" id="{E446FB40-BD26-FDAF-F3A8-326C0D149C37}"/>
+              </a:ext>
+            </a:extLst>
+          </p:cNvPr>
+          <p:cNvCxnSpPr>
+            <a:cxnSpLocks/>
+          </p:cNvCxnSpPr>
+          <p:nvPr/>
+        </p:nvCxnSpPr>
+        <p:spPr>
+          <a:xfrm flipV="1">
+            <a:off x="10097827" y="5458609"/>
+            <a:ext cx="0" cy="470182"/>
+          </a:xfrm>
+          <a:prstGeom prst="straightConnector1">
+            <a:avLst/>
+          </a:prstGeom>
+          <a:ln w="25400">
+            <a:solidFill>
+              <a:schemeClr val="tx1"/>
+            </a:solidFill>
+            <a:headEnd type="arrow" w="med" len="med"/>
+            <a:tailEnd type="none" w="med" len="med"/>
+          </a:ln>
+        </p:spPr>
+        <p:style>
+          <a:lnRef idx="1">
+            <a:schemeClr val="accent1"/>
+          </a:lnRef>
+          <a:fillRef idx="0">
+            <a:schemeClr val="accent1"/>
+          </a:fillRef>
+          <a:effectRef idx="0">
+            <a:schemeClr val="accent1"/>
+          </a:effectRef>
+          <a:fontRef idx="minor">
+            <a:schemeClr val="tx1"/>
+          </a:fontRef>
+        </p:style>
+      </p:cxnSp>
+      <p:cxnSp>
+        <p:nvCxnSpPr>
+          <p:cNvPr id="4" name="Straight Arrow Connector 3">
+            <a:extLst>
+              <a:ext uri="{FF2B5EF4-FFF2-40B4-BE49-F238E27FC236}">
+                <a16:creationId xmlns:a16="http://schemas.microsoft.com/office/drawing/2014/main" id="{96739584-C4FE-B63B-E087-910EBFAA4F9A}"/>
+              </a:ext>
+            </a:extLst>
+          </p:cNvPr>
+          <p:cNvCxnSpPr>
+            <a:cxnSpLocks/>
+          </p:cNvCxnSpPr>
+          <p:nvPr/>
+        </p:nvCxnSpPr>
+        <p:spPr>
+          <a:xfrm flipV="1">
+            <a:off x="10097827" y="6628406"/>
+            <a:ext cx="0" cy="470182"/>
+          </a:xfrm>
+          <a:prstGeom prst="straightConnector1">
+            <a:avLst/>
+          </a:prstGeom>
+          <a:ln w="25400">
+            <a:solidFill>
+              <a:schemeClr val="tx1"/>
+            </a:solidFill>
+            <a:headEnd type="arrow" w="med" len="med"/>
+            <a:tailEnd type="none" w="med" len="med"/>
+          </a:ln>
+        </p:spPr>
+        <p:style>
+          <a:lnRef idx="1">
+            <a:schemeClr val="accent1"/>
+          </a:lnRef>
+          <a:fillRef idx="0">
+            <a:schemeClr val="accent1"/>
+          </a:fillRef>
+          <a:effectRef idx="0">
+            <a:schemeClr val="accent1"/>
+          </a:effectRef>
+          <a:fontRef idx="minor">
+            <a:schemeClr val="tx1"/>
+          </a:fontRef>
+        </p:style>
+      </p:cxnSp>
+      <p:pic>
+        <p:nvPicPr>
+          <p:cNvPr id="1030" name="Picture 6" descr="Power Bi Logo, Visualization, Icon, Emblem, Branding PNG">
+            <a:extLst>
+              <a:ext uri="{FF2B5EF4-FFF2-40B4-BE49-F238E27FC236}">
+                <a16:creationId xmlns:a16="http://schemas.microsoft.com/office/drawing/2014/main" id="{02FFFB6F-64D7-75B3-2185-B44D538AD446}"/>
+              </a:ext>
+            </a:extLst>
+          </p:cNvPr>
+          <p:cNvPicPr>
+            <a:picLocks noChangeAspect="1" noChangeArrowheads="1"/>
+          </p:cNvPicPr>
+          <p:nvPr/>
+        </p:nvPicPr>
+        <p:blipFill>
+          <a:blip r:embed="rId6">
+            <a:extLst>
+              <a:ext uri="{28A0092B-C50C-407E-A947-70E740481C1C}">
+                <a14:useLocalDpi xmlns:a14="http://schemas.microsoft.com/office/drawing/2010/main" val="0"/>
+              </a:ext>
+            </a:extLst>
+          </a:blip>
+          <a:srcRect/>
+          <a:stretch>
+            <a:fillRect/>
+          </a:stretch>
+        </p:blipFill>
+        <p:spPr bwMode="auto">
+          <a:xfrm>
+            <a:off x="14141427" y="11176098"/>
+            <a:ext cx="172368" cy="45719"/>
+          </a:xfrm>
+          <a:prstGeom prst="rect">
+            <a:avLst/>
+          </a:prstGeom>
+          <a:noFill/>
+          <a:extLst>
+            <a:ext uri="{909E8E84-426E-40DD-AFC4-6F175D3DCCD1}">
+              <a14:hiddenFill xmlns:a14="http://schemas.microsoft.com/office/drawing/2010/main">
+                <a:solidFill>
+                  <a:srgbClr val="FFFFFF"/>
+                </a:solidFill>
+              </a14:hiddenFill>
+            </a:ext>
+          </a:extLst>
+        </p:spPr>
+      </p:pic>
+      <p:pic>
+        <p:nvPicPr>
+          <p:cNvPr id="1056" name="Picture 32" descr="Power BI Logo, symbol, meaning, history, PNG, brand">
+            <a:extLst>
+              <a:ext uri="{FF2B5EF4-FFF2-40B4-BE49-F238E27FC236}">
+                <a16:creationId xmlns:a16="http://schemas.microsoft.com/office/drawing/2014/main" id="{14E78DC0-45AD-710E-BAB3-7687995CFB75}"/>
+              </a:ext>
+            </a:extLst>
+          </p:cNvPr>
+          <p:cNvPicPr>
+            <a:picLocks noChangeAspect="1" noChangeArrowheads="1"/>
+          </p:cNvPicPr>
+          <p:nvPr/>
+        </p:nvPicPr>
+        <p:blipFill rotWithShape="1">
+          <a:blip r:embed="rId7">
+            <a:extLst>
+              <a:ext uri="{28A0092B-C50C-407E-A947-70E740481C1C}">
+                <a14:useLocalDpi xmlns:a14="http://schemas.microsoft.com/office/drawing/2010/main" val="0"/>
+              </a:ext>
+            </a:extLst>
+          </a:blip>
+          <a:srcRect l="22626" r="22990"/>
+          <a:stretch>
+            <a:fillRect/>
+          </a:stretch>
+        </p:blipFill>
+        <p:spPr bwMode="auto">
+          <a:xfrm>
+            <a:off x="7403636" y="6859564"/>
+            <a:ext cx="1054943" cy="1091047"/>
+          </a:xfrm>
+          <a:prstGeom prst="rect">
+            <a:avLst/>
+          </a:prstGeom>
+          <a:noFill/>
+          <a:extLst>
+            <a:ext uri="{909E8E84-426E-40DD-AFC4-6F175D3DCCD1}">
+              <a14:hiddenFill xmlns:a14="http://schemas.microsoft.com/office/drawing/2010/main">
+                <a:solidFill>
+                  <a:srgbClr val="FFFFFF"/>
+                </a:solidFill>
+              </a14:hiddenFill>
+            </a:ext>
+          </a:extLst>
+        </p:spPr>
+      </p:pic>
+      <p:pic>
+        <p:nvPicPr>
+          <p:cNvPr id="7" name="Picture 6" descr="A logo with blue red white and grey squares&#10;&#10;AI-generated content may be incorrect.">
+            <a:extLst>
+              <a:ext uri="{FF2B5EF4-FFF2-40B4-BE49-F238E27FC236}">
+                <a16:creationId xmlns:a16="http://schemas.microsoft.com/office/drawing/2014/main" id="{DC047D81-024E-CCC3-CC48-E46185029DBA}"/>
+              </a:ext>
+            </a:extLst>
+          </p:cNvPr>
+          <p:cNvPicPr>
+            <a:picLocks noChangeAspect="1"/>
+          </p:cNvPicPr>
+          <p:nvPr/>
+        </p:nvPicPr>
+        <p:blipFill>
+          <a:blip r:embed="rId8">
+            <a:extLst>
+              <a:ext uri="{28A0092B-C50C-407E-A947-70E740481C1C}">
+                <a14:useLocalDpi xmlns:a14="http://schemas.microsoft.com/office/drawing/2010/main" val="0"/>
+              </a:ext>
+            </a:extLst>
+          </a:blip>
+          <a:stretch>
+            <a:fillRect/>
+          </a:stretch>
+        </p:blipFill>
+        <p:spPr>
+          <a:xfrm>
+            <a:off x="4784807" y="5656102"/>
+            <a:ext cx="913830" cy="1246450"/>
+          </a:xfrm>
+          <a:prstGeom prst="rect">
+            <a:avLst/>
+          </a:prstGeom>
+        </p:spPr>
+      </p:pic>
+      <p:sp>
+        <p:nvSpPr>
+          <p:cNvPr id="10" name="TextBox 9">
+            <a:extLst>
+              <a:ext uri="{FF2B5EF4-FFF2-40B4-BE49-F238E27FC236}">
+                <a16:creationId xmlns:a16="http://schemas.microsoft.com/office/drawing/2014/main" id="{7DF55ABC-B385-E6D5-C76A-356ACBFD3363}"/>
+              </a:ext>
+            </a:extLst>
+          </p:cNvPr>
+          <p:cNvSpPr txBox="1"/>
+          <p:nvPr/>
+        </p:nvSpPr>
+        <p:spPr>
+          <a:xfrm>
+            <a:off x="4377079" y="7023857"/>
+            <a:ext cx="1631498" cy="856004"/>
+          </a:xfrm>
+          <a:prstGeom prst="rect">
+            <a:avLst/>
+          </a:prstGeom>
+          <a:noFill/>
+        </p:spPr>
+        <p:txBody>
+          <a:bodyPr wrap="square">
+            <a:spAutoFit/>
+          </a:bodyPr>
+          <a:lstStyle/>
+          <a:p>
+            <a:pPr algn="ctr"/>
+            <a:r>
+              <a:rPr lang="en-US" sz="1654" i="1" noProof="1"/>
+              <a:t>Generate CVXlab Model object instance</a:t>
+            </a:r>
+          </a:p>
+        </p:txBody>
+      </p:sp>
+      <p:pic>
+        <p:nvPicPr>
+          <p:cNvPr id="30" name="Picture 29">
+            <a:extLst>
+              <a:ext uri="{FF2B5EF4-FFF2-40B4-BE49-F238E27FC236}">
+                <a16:creationId xmlns:a16="http://schemas.microsoft.com/office/drawing/2014/main" id="{4FC149C7-7E1B-523D-7887-B1E748052069}"/>
+              </a:ext>
+            </a:extLst>
+          </p:cNvPr>
+          <p:cNvPicPr>
+            <a:picLocks noChangeAspect="1"/>
+          </p:cNvPicPr>
+          <p:nvPr/>
+        </p:nvPicPr>
+        <p:blipFill>
+          <a:blip r:embed="rId9"/>
+          <a:stretch>
+            <a:fillRect/>
+          </a:stretch>
+        </p:blipFill>
+        <p:spPr>
+          <a:xfrm>
+            <a:off x="2185711" y="8797052"/>
+            <a:ext cx="10028789" cy="4005419"/>
+          </a:xfrm>
+          <a:prstGeom prst="rect">
+            <a:avLst/>
+          </a:prstGeom>
+        </p:spPr>
+      </p:pic>
+    </p:spTree>
+    <p:extLst>
+      <p:ext uri="{BB962C8B-B14F-4D97-AF65-F5344CB8AC3E}">
+        <p14:creationId xmlns:p14="http://schemas.microsoft.com/office/powerpoint/2010/main" val="598312206"/>
       </p:ext>
     </p:extLst>
   </p:cSld>

</xml_diff>

<commit_message>
Advancing package documentatation. Fixing figures and rst modules.
</commit_message>
<xml_diff>
--- a/docs/images/flowchart.pptx
+++ b/docs/images/flowchart.pptx
@@ -245,7 +245,7 @@
           <a:p>
             <a:fld id="{C4BA104D-BBF9-4279-8CEB-A5CF88D2DFAC}" type="datetimeFigureOut">
               <a:rPr lang="en-US" smtClean="0"/>
-              <a:t>10/15/2025</a:t>
+              <a:t>10/30/2025</a:t>
             </a:fld>
             <a:endParaRPr lang="en-US"/>
           </a:p>
@@ -415,7 +415,7 @@
           <a:p>
             <a:fld id="{C4BA104D-BBF9-4279-8CEB-A5CF88D2DFAC}" type="datetimeFigureOut">
               <a:rPr lang="en-US" smtClean="0"/>
-              <a:t>10/15/2025</a:t>
+              <a:t>10/30/2025</a:t>
             </a:fld>
             <a:endParaRPr lang="en-US"/>
           </a:p>
@@ -595,7 +595,7 @@
           <a:p>
             <a:fld id="{C4BA104D-BBF9-4279-8CEB-A5CF88D2DFAC}" type="datetimeFigureOut">
               <a:rPr lang="en-US" smtClean="0"/>
-              <a:t>10/15/2025</a:t>
+              <a:t>10/30/2025</a:t>
             </a:fld>
             <a:endParaRPr lang="en-US"/>
           </a:p>
@@ -895,7 +895,7 @@
           <a:p>
             <a:fld id="{C4BA104D-BBF9-4279-8CEB-A5CF88D2DFAC}" type="datetimeFigureOut">
               <a:rPr lang="en-US" smtClean="0"/>
-              <a:t>10/15/2025</a:t>
+              <a:t>10/30/2025</a:t>
             </a:fld>
             <a:endParaRPr lang="en-US"/>
           </a:p>
@@ -1141,7 +1141,7 @@
           <a:p>
             <a:fld id="{C4BA104D-BBF9-4279-8CEB-A5CF88D2DFAC}" type="datetimeFigureOut">
               <a:rPr lang="en-US" smtClean="0"/>
-              <a:t>10/15/2025</a:t>
+              <a:t>10/30/2025</a:t>
             </a:fld>
             <a:endParaRPr lang="en-US"/>
           </a:p>
@@ -1373,7 +1373,7 @@
           <a:p>
             <a:fld id="{C4BA104D-BBF9-4279-8CEB-A5CF88D2DFAC}" type="datetimeFigureOut">
               <a:rPr lang="en-US" smtClean="0"/>
-              <a:t>10/15/2025</a:t>
+              <a:t>10/30/2025</a:t>
             </a:fld>
             <a:endParaRPr lang="en-US"/>
           </a:p>
@@ -1740,7 +1740,7 @@
           <a:p>
             <a:fld id="{C4BA104D-BBF9-4279-8CEB-A5CF88D2DFAC}" type="datetimeFigureOut">
               <a:rPr lang="en-US" smtClean="0"/>
-              <a:t>10/15/2025</a:t>
+              <a:t>10/30/2025</a:t>
             </a:fld>
             <a:endParaRPr lang="en-US"/>
           </a:p>
@@ -1858,7 +1858,7 @@
           <a:p>
             <a:fld id="{C4BA104D-BBF9-4279-8CEB-A5CF88D2DFAC}" type="datetimeFigureOut">
               <a:rPr lang="en-US" smtClean="0"/>
-              <a:t>10/15/2025</a:t>
+              <a:t>10/30/2025</a:t>
             </a:fld>
             <a:endParaRPr lang="en-US"/>
           </a:p>
@@ -1953,7 +1953,7 @@
           <a:p>
             <a:fld id="{C4BA104D-BBF9-4279-8CEB-A5CF88D2DFAC}" type="datetimeFigureOut">
               <a:rPr lang="en-US" smtClean="0"/>
-              <a:t>10/15/2025</a:t>
+              <a:t>10/30/2025</a:t>
             </a:fld>
             <a:endParaRPr lang="en-US"/>
           </a:p>
@@ -2230,7 +2230,7 @@
           <a:p>
             <a:fld id="{C4BA104D-BBF9-4279-8CEB-A5CF88D2DFAC}" type="datetimeFigureOut">
               <a:rPr lang="en-US" smtClean="0"/>
-              <a:t>10/15/2025</a:t>
+              <a:t>10/30/2025</a:t>
             </a:fld>
             <a:endParaRPr lang="en-US"/>
           </a:p>
@@ -2487,7 +2487,7 @@
           <a:p>
             <a:fld id="{C4BA104D-BBF9-4279-8CEB-A5CF88D2DFAC}" type="datetimeFigureOut">
               <a:rPr lang="en-US" smtClean="0"/>
-              <a:t>10/15/2025</a:t>
+              <a:t>10/30/2025</a:t>
             </a:fld>
             <a:endParaRPr lang="en-US"/>
           </a:p>
@@ -2700,7 +2700,7 @@
           <a:p>
             <a:fld id="{C4BA104D-BBF9-4279-8CEB-A5CF88D2DFAC}" type="datetimeFigureOut">
               <a:rPr lang="en-US" smtClean="0"/>
-              <a:t>10/15/2025</a:t>
+              <a:t>10/30/2025</a:t>
             </a:fld>
             <a:endParaRPr lang="en-US"/>
           </a:p>
@@ -6450,7 +6450,7 @@
                 <a:ea typeface="Fira Code" pitchFamily="1" charset="0"/>
                 <a:cs typeface="Fira Code" pitchFamily="1" charset="0"/>
               </a:rPr>
-              <a:t>4. Generation of model class instance</a:t>
+              <a:t>4. Generation of Model class instance</a:t>
             </a:r>
           </a:p>
         </p:txBody>
@@ -8010,36 +8010,6 @@
           </a:p>
         </p:txBody>
       </p:sp>
-      <p:pic>
-        <p:nvPicPr>
-          <p:cNvPr id="24" name="Picture 23">
-            <a:extLst>
-              <a:ext uri="{FF2B5EF4-FFF2-40B4-BE49-F238E27FC236}">
-                <a16:creationId xmlns:a16="http://schemas.microsoft.com/office/drawing/2014/main" id="{908030DB-F1E7-150B-F62E-C531D8CDE00E}"/>
-              </a:ext>
-            </a:extLst>
-          </p:cNvPr>
-          <p:cNvPicPr>
-            <a:picLocks noChangeAspect="1"/>
-          </p:cNvPicPr>
-          <p:nvPr/>
-        </p:nvPicPr>
-        <p:blipFill>
-          <a:blip r:embed="rId2"/>
-          <a:stretch>
-            <a:fillRect/>
-          </a:stretch>
-        </p:blipFill>
-        <p:spPr>
-          <a:xfrm>
-            <a:off x="7374777" y="2530182"/>
-            <a:ext cx="6322100" cy="6346486"/>
-          </a:xfrm>
-          <a:prstGeom prst="rect">
-            <a:avLst/>
-          </a:prstGeom>
-        </p:spPr>
-      </p:pic>
       <p:sp>
         <p:nvSpPr>
           <p:cNvPr id="78" name="Rettangolo 19">
@@ -8158,7 +8128,7 @@
                 <a:ea typeface="Fira Code" pitchFamily="1" charset="0"/>
                 <a:cs typeface="Fira Code" pitchFamily="1" charset="0"/>
               </a:rPr>
-              <a:t>1. Generation of model class instance</a:t>
+              <a:t>1. Generation of Model class instance</a:t>
             </a:r>
           </a:p>
         </p:txBody>
@@ -9132,10 +9102,40 @@
       </p:sp>
       <p:pic>
         <p:nvPicPr>
-          <p:cNvPr id="2" name="Picture 1">
-            <a:extLst>
-              <a:ext uri="{FF2B5EF4-FFF2-40B4-BE49-F238E27FC236}">
-                <a16:creationId xmlns:a16="http://schemas.microsoft.com/office/drawing/2014/main" id="{4A86A3B0-3042-8087-4E96-650B93057A2F}"/>
+          <p:cNvPr id="38" name="Picture 37">
+            <a:extLst>
+              <a:ext uri="{FF2B5EF4-FFF2-40B4-BE49-F238E27FC236}">
+                <a16:creationId xmlns:a16="http://schemas.microsoft.com/office/drawing/2014/main" id="{D406F134-ED6E-7C35-B99A-ED619660F62E}"/>
+              </a:ext>
+            </a:extLst>
+          </p:cNvPr>
+          <p:cNvPicPr>
+            <a:picLocks noChangeAspect="1"/>
+          </p:cNvPicPr>
+          <p:nvPr/>
+        </p:nvPicPr>
+        <p:blipFill>
+          <a:blip r:embed="rId2"/>
+          <a:stretch>
+            <a:fillRect/>
+          </a:stretch>
+        </p:blipFill>
+        <p:spPr>
+          <a:xfrm>
+            <a:off x="7417635" y="2495254"/>
+            <a:ext cx="6322100" cy="6346486"/>
+          </a:xfrm>
+          <a:prstGeom prst="rect">
+            <a:avLst/>
+          </a:prstGeom>
+        </p:spPr>
+      </p:pic>
+      <p:pic>
+        <p:nvPicPr>
+          <p:cNvPr id="39" name="Picture 38">
+            <a:extLst>
+              <a:ext uri="{FF2B5EF4-FFF2-40B4-BE49-F238E27FC236}">
+                <a16:creationId xmlns:a16="http://schemas.microsoft.com/office/drawing/2014/main" id="{C9650B60-AEB7-7AB1-14A4-53CF4A5320F6}"/>
               </a:ext>
             </a:extLst>
           </p:cNvPr>
@@ -9152,7 +9152,7 @@
         </p:blipFill>
         <p:spPr>
           <a:xfrm>
-            <a:off x="7320736" y="10097394"/>
+            <a:off x="7417635" y="10094218"/>
             <a:ext cx="6322100" cy="3218967"/>
           </a:xfrm>
           <a:prstGeom prst="rect">

</xml_diff>